<commit_message>
TP - Config Java + Profils
</commit_message>
<xml_diff>
--- a/schemas.pptx
+++ b/schemas.pptx
@@ -8,6 +8,9 @@
     <p:sldId id="256" r:id="rId2"/>
     <p:sldId id="257" r:id="rId3"/>
     <p:sldId id="258" r:id="rId4"/>
+    <p:sldId id="259" r:id="rId5"/>
+    <p:sldId id="260" r:id="rId6"/>
+    <p:sldId id="261" r:id="rId7"/>
   </p:sldIdLst>
   <p:sldSz cx="12192000" cy="6858000"/>
   <p:notesSz cx="6858000" cy="9144000"/>
@@ -263,7 +266,7 @@
           <a:p>
             <a:fld id="{3B644675-409E-A14A-916B-0BAB1041637D}" type="datetimeFigureOut">
               <a:rPr lang="en-FR" smtClean="0"/>
-              <a:t>26/01/2022</a:t>
+              <a:t>27/01/2022</a:t>
             </a:fld>
             <a:endParaRPr lang="en-FR"/>
           </a:p>
@@ -463,7 +466,7 @@
           <a:p>
             <a:fld id="{3B644675-409E-A14A-916B-0BAB1041637D}" type="datetimeFigureOut">
               <a:rPr lang="en-FR" smtClean="0"/>
-              <a:t>26/01/2022</a:t>
+              <a:t>27/01/2022</a:t>
             </a:fld>
             <a:endParaRPr lang="en-FR"/>
           </a:p>
@@ -673,7 +676,7 @@
           <a:p>
             <a:fld id="{3B644675-409E-A14A-916B-0BAB1041637D}" type="datetimeFigureOut">
               <a:rPr lang="en-FR" smtClean="0"/>
-              <a:t>26/01/2022</a:t>
+              <a:t>27/01/2022</a:t>
             </a:fld>
             <a:endParaRPr lang="en-FR"/>
           </a:p>
@@ -873,7 +876,7 @@
           <a:p>
             <a:fld id="{3B644675-409E-A14A-916B-0BAB1041637D}" type="datetimeFigureOut">
               <a:rPr lang="en-FR" smtClean="0"/>
-              <a:t>26/01/2022</a:t>
+              <a:t>27/01/2022</a:t>
             </a:fld>
             <a:endParaRPr lang="en-FR"/>
           </a:p>
@@ -1149,7 +1152,7 @@
           <a:p>
             <a:fld id="{3B644675-409E-A14A-916B-0BAB1041637D}" type="datetimeFigureOut">
               <a:rPr lang="en-FR" smtClean="0"/>
-              <a:t>26/01/2022</a:t>
+              <a:t>27/01/2022</a:t>
             </a:fld>
             <a:endParaRPr lang="en-FR"/>
           </a:p>
@@ -1417,7 +1420,7 @@
           <a:p>
             <a:fld id="{3B644675-409E-A14A-916B-0BAB1041637D}" type="datetimeFigureOut">
               <a:rPr lang="en-FR" smtClean="0"/>
-              <a:t>26/01/2022</a:t>
+              <a:t>27/01/2022</a:t>
             </a:fld>
             <a:endParaRPr lang="en-FR"/>
           </a:p>
@@ -1832,7 +1835,7 @@
           <a:p>
             <a:fld id="{3B644675-409E-A14A-916B-0BAB1041637D}" type="datetimeFigureOut">
               <a:rPr lang="en-FR" smtClean="0"/>
-              <a:t>26/01/2022</a:t>
+              <a:t>27/01/2022</a:t>
             </a:fld>
             <a:endParaRPr lang="en-FR"/>
           </a:p>
@@ -1974,7 +1977,7 @@
           <a:p>
             <a:fld id="{3B644675-409E-A14A-916B-0BAB1041637D}" type="datetimeFigureOut">
               <a:rPr lang="en-FR" smtClean="0"/>
-              <a:t>26/01/2022</a:t>
+              <a:t>27/01/2022</a:t>
             </a:fld>
             <a:endParaRPr lang="en-FR"/>
           </a:p>
@@ -2087,7 +2090,7 @@
           <a:p>
             <a:fld id="{3B644675-409E-A14A-916B-0BAB1041637D}" type="datetimeFigureOut">
               <a:rPr lang="en-FR" smtClean="0"/>
-              <a:t>26/01/2022</a:t>
+              <a:t>27/01/2022</a:t>
             </a:fld>
             <a:endParaRPr lang="en-FR"/>
           </a:p>
@@ -2400,7 +2403,7 @@
           <a:p>
             <a:fld id="{3B644675-409E-A14A-916B-0BAB1041637D}" type="datetimeFigureOut">
               <a:rPr lang="en-FR" smtClean="0"/>
-              <a:t>26/01/2022</a:t>
+              <a:t>27/01/2022</a:t>
             </a:fld>
             <a:endParaRPr lang="en-FR"/>
           </a:p>
@@ -2689,7 +2692,7 @@
           <a:p>
             <a:fld id="{3B644675-409E-A14A-916B-0BAB1041637D}" type="datetimeFigureOut">
               <a:rPr lang="en-FR" smtClean="0"/>
-              <a:t>26/01/2022</a:t>
+              <a:t>27/01/2022</a:t>
             </a:fld>
             <a:endParaRPr lang="en-FR"/>
           </a:p>
@@ -2932,7 +2935,7 @@
           <a:p>
             <a:fld id="{3B644675-409E-A14A-916B-0BAB1041637D}" type="datetimeFigureOut">
               <a:rPr lang="en-FR" smtClean="0"/>
-              <a:t>26/01/2022</a:t>
+              <a:t>27/01/2022</a:t>
             </a:fld>
             <a:endParaRPr lang="en-FR"/>
           </a:p>
@@ -5632,7 +5635,7 @@
         </p:nvSpPr>
         <p:spPr>
           <a:xfrm>
-            <a:off x="3178834" y="3125639"/>
+            <a:off x="10650028" y="1932317"/>
             <a:ext cx="458638" cy="392502"/>
           </a:xfrm>
           <a:prstGeom prst="ellipse">
@@ -5678,7 +5681,7 @@
         </p:nvSpPr>
         <p:spPr>
           <a:xfrm>
-            <a:off x="3514545" y="5204599"/>
+            <a:off x="10191390" y="4121265"/>
             <a:ext cx="458638" cy="392502"/>
           </a:xfrm>
           <a:prstGeom prst="ellipse">
@@ -5724,7 +5727,7 @@
         </p:nvSpPr>
         <p:spPr>
           <a:xfrm>
-            <a:off x="4360653" y="576541"/>
+            <a:off x="10726947" y="567201"/>
             <a:ext cx="458638" cy="392502"/>
           </a:xfrm>
           <a:prstGeom prst="ellipse">
@@ -5756,10 +5759,1937 @@
           </a:p>
         </p:txBody>
       </p:sp>
+      <p:sp>
+        <p:nvSpPr>
+          <p:cNvPr id="2" name="TextBox 1">
+            <a:extLst>
+              <a:ext uri="{FF2B5EF4-FFF2-40B4-BE49-F238E27FC236}">
+                <a16:creationId xmlns:a16="http://schemas.microsoft.com/office/drawing/2014/main" id="{96F20BBF-2F7E-1E43-B999-EED49DA1DEBF}"/>
+              </a:ext>
+            </a:extLst>
+          </p:cNvPr>
+          <p:cNvSpPr txBox="1"/>
+          <p:nvPr/>
+        </p:nvSpPr>
+        <p:spPr>
+          <a:xfrm>
+            <a:off x="3258181" y="5472988"/>
+            <a:ext cx="1396216" cy="369332"/>
+          </a:xfrm>
+          <a:prstGeom prst="rect">
+            <a:avLst/>
+          </a:prstGeom>
+          <a:noFill/>
+        </p:spPr>
+        <p:txBody>
+          <a:bodyPr wrap="none" rtlCol="0">
+            <a:spAutoFit/>
+          </a:bodyPr>
+          <a:lstStyle/>
+          <a:p>
+            <a:r>
+              <a:rPr lang="en-FR" dirty="0">
+                <a:solidFill>
+                  <a:schemeClr val="accent6"/>
+                </a:solidFill>
+              </a:rPr>
+              <a:t>@Repository</a:t>
+            </a:r>
+          </a:p>
+        </p:txBody>
+      </p:sp>
+      <p:sp>
+        <p:nvSpPr>
+          <p:cNvPr id="24" name="TextBox 23">
+            <a:extLst>
+              <a:ext uri="{FF2B5EF4-FFF2-40B4-BE49-F238E27FC236}">
+                <a16:creationId xmlns:a16="http://schemas.microsoft.com/office/drawing/2014/main" id="{0C6F6354-773A-C94B-AE82-30CDE73FB262}"/>
+              </a:ext>
+            </a:extLst>
+          </p:cNvPr>
+          <p:cNvSpPr txBox="1"/>
+          <p:nvPr/>
+        </p:nvSpPr>
+        <p:spPr>
+          <a:xfrm>
+            <a:off x="3722298" y="3519744"/>
+            <a:ext cx="1065228" cy="369332"/>
+          </a:xfrm>
+          <a:prstGeom prst="rect">
+            <a:avLst/>
+          </a:prstGeom>
+          <a:noFill/>
+        </p:spPr>
+        <p:txBody>
+          <a:bodyPr wrap="none" rtlCol="0">
+            <a:spAutoFit/>
+          </a:bodyPr>
+          <a:lstStyle/>
+          <a:p>
+            <a:r>
+              <a:rPr lang="en-FR" dirty="0">
+                <a:solidFill>
+                  <a:schemeClr val="accent6"/>
+                </a:solidFill>
+              </a:rPr>
+              <a:t>@Service</a:t>
+            </a:r>
+          </a:p>
+        </p:txBody>
+      </p:sp>
+      <p:sp>
+        <p:nvSpPr>
+          <p:cNvPr id="30" name="TextBox 29">
+            <a:extLst>
+              <a:ext uri="{FF2B5EF4-FFF2-40B4-BE49-F238E27FC236}">
+                <a16:creationId xmlns:a16="http://schemas.microsoft.com/office/drawing/2014/main" id="{DD5BE9D6-A6C4-9A46-8AF2-2CF755C2D343}"/>
+              </a:ext>
+            </a:extLst>
+          </p:cNvPr>
+          <p:cNvSpPr txBox="1"/>
+          <p:nvPr/>
+        </p:nvSpPr>
+        <p:spPr>
+          <a:xfrm>
+            <a:off x="5330318" y="5482580"/>
+            <a:ext cx="1396216" cy="369332"/>
+          </a:xfrm>
+          <a:prstGeom prst="rect">
+            <a:avLst/>
+          </a:prstGeom>
+          <a:noFill/>
+        </p:spPr>
+        <p:txBody>
+          <a:bodyPr wrap="none" rtlCol="0">
+            <a:spAutoFit/>
+          </a:bodyPr>
+          <a:lstStyle/>
+          <a:p>
+            <a:r>
+              <a:rPr lang="en-FR" dirty="0">
+                <a:solidFill>
+                  <a:schemeClr val="accent6"/>
+                </a:solidFill>
+              </a:rPr>
+              <a:t>@Repository</a:t>
+            </a:r>
+          </a:p>
+        </p:txBody>
+      </p:sp>
+      <p:sp>
+        <p:nvSpPr>
+          <p:cNvPr id="32" name="TextBox 31">
+            <a:extLst>
+              <a:ext uri="{FF2B5EF4-FFF2-40B4-BE49-F238E27FC236}">
+                <a16:creationId xmlns:a16="http://schemas.microsoft.com/office/drawing/2014/main" id="{72434DFF-8E60-2248-B76F-BBCA1ACE88D4}"/>
+              </a:ext>
+            </a:extLst>
+          </p:cNvPr>
+          <p:cNvSpPr txBox="1"/>
+          <p:nvPr/>
+        </p:nvSpPr>
+        <p:spPr>
+          <a:xfrm>
+            <a:off x="5940859" y="3569900"/>
+            <a:ext cx="1065228" cy="369332"/>
+          </a:xfrm>
+          <a:prstGeom prst="rect">
+            <a:avLst/>
+          </a:prstGeom>
+          <a:noFill/>
+        </p:spPr>
+        <p:txBody>
+          <a:bodyPr wrap="none" rtlCol="0">
+            <a:spAutoFit/>
+          </a:bodyPr>
+          <a:lstStyle/>
+          <a:p>
+            <a:r>
+              <a:rPr lang="en-FR" dirty="0">
+                <a:solidFill>
+                  <a:schemeClr val="accent6"/>
+                </a:solidFill>
+              </a:rPr>
+              <a:t>@Service</a:t>
+            </a:r>
+          </a:p>
+        </p:txBody>
+      </p:sp>
+      <p:sp>
+        <p:nvSpPr>
+          <p:cNvPr id="33" name="TextBox 32">
+            <a:extLst>
+              <a:ext uri="{FF2B5EF4-FFF2-40B4-BE49-F238E27FC236}">
+                <a16:creationId xmlns:a16="http://schemas.microsoft.com/office/drawing/2014/main" id="{BC4DCCD0-BBC9-7141-B169-92C960329A88}"/>
+              </a:ext>
+            </a:extLst>
+          </p:cNvPr>
+          <p:cNvSpPr txBox="1"/>
+          <p:nvPr/>
+        </p:nvSpPr>
+        <p:spPr>
+          <a:xfrm>
+            <a:off x="6665608" y="2983470"/>
+            <a:ext cx="2511585" cy="369332"/>
+          </a:xfrm>
+          <a:prstGeom prst="rect">
+            <a:avLst/>
+          </a:prstGeom>
+          <a:noFill/>
+        </p:spPr>
+        <p:txBody>
+          <a:bodyPr wrap="none" rtlCol="0">
+            <a:spAutoFit/>
+          </a:bodyPr>
+          <a:lstStyle/>
+          <a:p>
+            <a:r>
+              <a:rPr lang="en-FR" dirty="0">
+                <a:solidFill>
+                  <a:schemeClr val="accent6"/>
+                </a:solidFill>
+              </a:rPr>
+              <a:t>@Profile(“NOM_A_TOI”)</a:t>
+            </a:r>
+          </a:p>
+        </p:txBody>
+      </p:sp>
+      <p:sp>
+        <p:nvSpPr>
+          <p:cNvPr id="34" name="TextBox 33">
+            <a:extLst>
+              <a:ext uri="{FF2B5EF4-FFF2-40B4-BE49-F238E27FC236}">
+                <a16:creationId xmlns:a16="http://schemas.microsoft.com/office/drawing/2014/main" id="{C06441C5-F713-7744-8751-8FAE91036C2F}"/>
+              </a:ext>
+            </a:extLst>
+          </p:cNvPr>
+          <p:cNvSpPr txBox="1"/>
+          <p:nvPr/>
+        </p:nvSpPr>
+        <p:spPr>
+          <a:xfrm>
+            <a:off x="2999119" y="3075489"/>
+            <a:ext cx="2511585" cy="369332"/>
+          </a:xfrm>
+          <a:prstGeom prst="rect">
+            <a:avLst/>
+          </a:prstGeom>
+          <a:noFill/>
+        </p:spPr>
+        <p:txBody>
+          <a:bodyPr wrap="none" rtlCol="0">
+            <a:spAutoFit/>
+          </a:bodyPr>
+          <a:lstStyle/>
+          <a:p>
+            <a:r>
+              <a:rPr lang="en-FR" dirty="0">
+                <a:solidFill>
+                  <a:schemeClr val="accent6"/>
+                </a:solidFill>
+              </a:rPr>
+              <a:t>@Profile(“NOM_A_TOI”)</a:t>
+            </a:r>
+          </a:p>
+        </p:txBody>
+      </p:sp>
+      <p:sp>
+        <p:nvSpPr>
+          <p:cNvPr id="35" name="TextBox 34">
+            <a:extLst>
+              <a:ext uri="{FF2B5EF4-FFF2-40B4-BE49-F238E27FC236}">
+                <a16:creationId xmlns:a16="http://schemas.microsoft.com/office/drawing/2014/main" id="{4B146CB4-E72F-4044-BECB-35CC4BDC7829}"/>
+              </a:ext>
+            </a:extLst>
+          </p:cNvPr>
+          <p:cNvSpPr txBox="1"/>
+          <p:nvPr/>
+        </p:nvSpPr>
+        <p:spPr>
+          <a:xfrm>
+            <a:off x="5017117" y="4947415"/>
+            <a:ext cx="2511585" cy="369332"/>
+          </a:xfrm>
+          <a:prstGeom prst="rect">
+            <a:avLst/>
+          </a:prstGeom>
+          <a:noFill/>
+        </p:spPr>
+        <p:txBody>
+          <a:bodyPr wrap="none" rtlCol="0">
+            <a:spAutoFit/>
+          </a:bodyPr>
+          <a:lstStyle/>
+          <a:p>
+            <a:r>
+              <a:rPr lang="en-FR" dirty="0">
+                <a:solidFill>
+                  <a:schemeClr val="accent6"/>
+                </a:solidFill>
+              </a:rPr>
+              <a:t>@Profile(“NOM_A_TOI”)</a:t>
+            </a:r>
+          </a:p>
+        </p:txBody>
+      </p:sp>
+      <p:sp>
+        <p:nvSpPr>
+          <p:cNvPr id="36" name="TextBox 35">
+            <a:extLst>
+              <a:ext uri="{FF2B5EF4-FFF2-40B4-BE49-F238E27FC236}">
+                <a16:creationId xmlns:a16="http://schemas.microsoft.com/office/drawing/2014/main" id="{5B53B042-24DC-BE44-BAD5-CBEE23E851DE}"/>
+              </a:ext>
+            </a:extLst>
+          </p:cNvPr>
+          <p:cNvSpPr txBox="1"/>
+          <p:nvPr/>
+        </p:nvSpPr>
+        <p:spPr>
+          <a:xfrm>
+            <a:off x="2275941" y="4979678"/>
+            <a:ext cx="2511585" cy="369332"/>
+          </a:xfrm>
+          <a:prstGeom prst="rect">
+            <a:avLst/>
+          </a:prstGeom>
+          <a:noFill/>
+        </p:spPr>
+        <p:txBody>
+          <a:bodyPr wrap="none" rtlCol="0">
+            <a:spAutoFit/>
+          </a:bodyPr>
+          <a:lstStyle/>
+          <a:p>
+            <a:r>
+              <a:rPr lang="en-FR" dirty="0">
+                <a:solidFill>
+                  <a:schemeClr val="accent6"/>
+                </a:solidFill>
+              </a:rPr>
+              <a:t>@Profile(“NOM_A_TOI”)</a:t>
+            </a:r>
+          </a:p>
+        </p:txBody>
+      </p:sp>
     </p:spTree>
     <p:extLst>
       <p:ext uri="{BB962C8B-B14F-4D97-AF65-F5344CB8AC3E}">
         <p14:creationId xmlns:p14="http://schemas.microsoft.com/office/powerpoint/2010/main" val="807142943"/>
+      </p:ext>
+    </p:extLst>
+  </p:cSld>
+  <p:clrMapOvr>
+    <a:masterClrMapping/>
+  </p:clrMapOvr>
+</p:sld>
+</file>
+
+<file path=ppt/slides/slide4.xml><?xml version="1.0" encoding="utf-8"?>
+<p:sld xmlns:a="http://schemas.openxmlformats.org/drawingml/2006/main" xmlns:r="http://schemas.openxmlformats.org/officeDocument/2006/relationships" xmlns:p="http://schemas.openxmlformats.org/presentationml/2006/main">
+  <p:cSld>
+    <p:spTree>
+      <p:nvGrpSpPr>
+        <p:cNvPr id="1" name=""/>
+        <p:cNvGrpSpPr/>
+        <p:nvPr/>
+      </p:nvGrpSpPr>
+      <p:grpSpPr>
+        <a:xfrm>
+          <a:off x="0" y="0"/>
+          <a:ext cx="0" cy="0"/>
+          <a:chOff x="0" y="0"/>
+          <a:chExt cx="0" cy="0"/>
+        </a:xfrm>
+      </p:grpSpPr>
+      <p:sp>
+        <p:nvSpPr>
+          <p:cNvPr id="4" name="Rounded Rectangle 3">
+            <a:extLst>
+              <a:ext uri="{FF2B5EF4-FFF2-40B4-BE49-F238E27FC236}">
+                <a16:creationId xmlns:a16="http://schemas.microsoft.com/office/drawing/2014/main" id="{28C86D09-2AB2-BA4E-B606-F9500AF6F233}"/>
+              </a:ext>
+            </a:extLst>
+          </p:cNvPr>
+          <p:cNvSpPr/>
+          <p:nvPr/>
+        </p:nvSpPr>
+        <p:spPr>
+          <a:xfrm>
+            <a:off x="1224951" y="483079"/>
+            <a:ext cx="9903124" cy="5589917"/>
+          </a:xfrm>
+          <a:prstGeom prst="roundRect">
+            <a:avLst/>
+          </a:prstGeom>
+        </p:spPr>
+        <p:style>
+          <a:lnRef idx="2">
+            <a:schemeClr val="accent1">
+              <a:shade val="50000"/>
+            </a:schemeClr>
+          </a:lnRef>
+          <a:fillRef idx="1">
+            <a:schemeClr val="accent1"/>
+          </a:fillRef>
+          <a:effectRef idx="0">
+            <a:schemeClr val="accent1"/>
+          </a:effectRef>
+          <a:fontRef idx="minor">
+            <a:schemeClr val="lt1"/>
+          </a:fontRef>
+        </p:style>
+        <p:txBody>
+          <a:bodyPr rtlCol="0" anchor="ctr"/>
+          <a:lstStyle/>
+          <a:p>
+            <a:pPr algn="ctr"/>
+            <a:r>
+              <a:rPr lang="en-FR" dirty="0"/>
+              <a:t>Contexte Spring</a:t>
+            </a:r>
+          </a:p>
+        </p:txBody>
+      </p:sp>
+      <p:sp>
+        <p:nvSpPr>
+          <p:cNvPr id="5" name="Oval 4">
+            <a:extLst>
+              <a:ext uri="{FF2B5EF4-FFF2-40B4-BE49-F238E27FC236}">
+                <a16:creationId xmlns:a16="http://schemas.microsoft.com/office/drawing/2014/main" id="{C5FE51B4-830A-1A4F-9EBC-8E82CD8407FE}"/>
+              </a:ext>
+            </a:extLst>
+          </p:cNvPr>
+          <p:cNvSpPr/>
+          <p:nvPr/>
+        </p:nvSpPr>
+        <p:spPr>
+          <a:xfrm>
+            <a:off x="2061713" y="2372264"/>
+            <a:ext cx="2035834" cy="715993"/>
+          </a:xfrm>
+          <a:prstGeom prst="ellipse">
+            <a:avLst/>
+          </a:prstGeom>
+        </p:spPr>
+        <p:style>
+          <a:lnRef idx="2">
+            <a:schemeClr val="accent4">
+              <a:shade val="50000"/>
+            </a:schemeClr>
+          </a:lnRef>
+          <a:fillRef idx="1">
+            <a:schemeClr val="accent4"/>
+          </a:fillRef>
+          <a:effectRef idx="0">
+            <a:schemeClr val="accent4"/>
+          </a:effectRef>
+          <a:fontRef idx="minor">
+            <a:schemeClr val="lt1"/>
+          </a:fontRef>
+        </p:style>
+        <p:txBody>
+          <a:bodyPr rtlCol="0" anchor="ctr"/>
+          <a:lstStyle/>
+          <a:p>
+            <a:pPr algn="ctr"/>
+            <a:r>
+              <a:rPr lang="en-FR" dirty="0"/>
+              <a:t>Bean 1</a:t>
+            </a:r>
+          </a:p>
+        </p:txBody>
+      </p:sp>
+      <p:sp>
+        <p:nvSpPr>
+          <p:cNvPr id="6" name="Oval 5">
+            <a:extLst>
+              <a:ext uri="{FF2B5EF4-FFF2-40B4-BE49-F238E27FC236}">
+                <a16:creationId xmlns:a16="http://schemas.microsoft.com/office/drawing/2014/main" id="{4AF173A7-36A5-2C47-BC18-0E886FBC9BA0}"/>
+              </a:ext>
+            </a:extLst>
+          </p:cNvPr>
+          <p:cNvSpPr/>
+          <p:nvPr/>
+        </p:nvSpPr>
+        <p:spPr>
+          <a:xfrm>
+            <a:off x="2291750" y="4261449"/>
+            <a:ext cx="2035834" cy="715993"/>
+          </a:xfrm>
+          <a:prstGeom prst="ellipse">
+            <a:avLst/>
+          </a:prstGeom>
+        </p:spPr>
+        <p:style>
+          <a:lnRef idx="2">
+            <a:schemeClr val="accent4">
+              <a:shade val="50000"/>
+            </a:schemeClr>
+          </a:lnRef>
+          <a:fillRef idx="1">
+            <a:schemeClr val="accent4"/>
+          </a:fillRef>
+          <a:effectRef idx="0">
+            <a:schemeClr val="accent4"/>
+          </a:effectRef>
+          <a:fontRef idx="minor">
+            <a:schemeClr val="lt1"/>
+          </a:fontRef>
+        </p:style>
+        <p:txBody>
+          <a:bodyPr rtlCol="0" anchor="ctr"/>
+          <a:lstStyle/>
+          <a:p>
+            <a:pPr algn="ctr"/>
+            <a:r>
+              <a:rPr lang="en-FR" dirty="0"/>
+              <a:t>Bean 2</a:t>
+            </a:r>
+          </a:p>
+        </p:txBody>
+      </p:sp>
+      <p:sp>
+        <p:nvSpPr>
+          <p:cNvPr id="7" name="Oval 6">
+            <a:extLst>
+              <a:ext uri="{FF2B5EF4-FFF2-40B4-BE49-F238E27FC236}">
+                <a16:creationId xmlns:a16="http://schemas.microsoft.com/office/drawing/2014/main" id="{528F9FF4-6631-2C49-9750-8163CD9BB8FC}"/>
+              </a:ext>
+            </a:extLst>
+          </p:cNvPr>
+          <p:cNvSpPr/>
+          <p:nvPr/>
+        </p:nvSpPr>
+        <p:spPr>
+          <a:xfrm>
+            <a:off x="5276490" y="1178943"/>
+            <a:ext cx="2035834" cy="715993"/>
+          </a:xfrm>
+          <a:prstGeom prst="ellipse">
+            <a:avLst/>
+          </a:prstGeom>
+        </p:spPr>
+        <p:style>
+          <a:lnRef idx="2">
+            <a:schemeClr val="accent4">
+              <a:shade val="50000"/>
+            </a:schemeClr>
+          </a:lnRef>
+          <a:fillRef idx="1">
+            <a:schemeClr val="accent4"/>
+          </a:fillRef>
+          <a:effectRef idx="0">
+            <a:schemeClr val="accent4"/>
+          </a:effectRef>
+          <a:fontRef idx="minor">
+            <a:schemeClr val="lt1"/>
+          </a:fontRef>
+        </p:style>
+        <p:txBody>
+          <a:bodyPr rtlCol="0" anchor="ctr"/>
+          <a:lstStyle/>
+          <a:p>
+            <a:pPr algn="ctr"/>
+            <a:r>
+              <a:rPr lang="en-FR" dirty="0"/>
+              <a:t>Bean 3</a:t>
+            </a:r>
+          </a:p>
+        </p:txBody>
+      </p:sp>
+      <p:sp>
+        <p:nvSpPr>
+          <p:cNvPr id="8" name="TextBox 7">
+            <a:extLst>
+              <a:ext uri="{FF2B5EF4-FFF2-40B4-BE49-F238E27FC236}">
+                <a16:creationId xmlns:a16="http://schemas.microsoft.com/office/drawing/2014/main" id="{E04DD0A2-2A2A-DB48-A7C6-A00A8E47D158}"/>
+              </a:ext>
+            </a:extLst>
+          </p:cNvPr>
+          <p:cNvSpPr txBox="1"/>
+          <p:nvPr/>
+        </p:nvSpPr>
+        <p:spPr>
+          <a:xfrm>
+            <a:off x="1026543" y="6251441"/>
+            <a:ext cx="4902561" cy="369332"/>
+          </a:xfrm>
+          <a:prstGeom prst="rect">
+            <a:avLst/>
+          </a:prstGeom>
+          <a:noFill/>
+        </p:spPr>
+        <p:txBody>
+          <a:bodyPr wrap="none" rtlCol="0">
+            <a:spAutoFit/>
+          </a:bodyPr>
+          <a:lstStyle/>
+          <a:p>
+            <a:r>
+              <a:rPr lang="en-FR" i="1" dirty="0"/>
+              <a:t>Bean = Objet qui se trouve dans le contexte Spring</a:t>
+            </a:r>
+          </a:p>
+        </p:txBody>
+      </p:sp>
+      <p:cxnSp>
+        <p:nvCxnSpPr>
+          <p:cNvPr id="10" name="Straight Arrow Connector 9">
+            <a:extLst>
+              <a:ext uri="{FF2B5EF4-FFF2-40B4-BE49-F238E27FC236}">
+                <a16:creationId xmlns:a16="http://schemas.microsoft.com/office/drawing/2014/main" id="{2581AE5D-2DEE-DC41-A639-BF30DD6684DB}"/>
+              </a:ext>
+            </a:extLst>
+          </p:cNvPr>
+          <p:cNvCxnSpPr/>
+          <p:nvPr/>
+        </p:nvCxnSpPr>
+        <p:spPr>
+          <a:xfrm>
+            <a:off x="3079630" y="2958860"/>
+            <a:ext cx="230037" cy="1518249"/>
+          </a:xfrm>
+          <a:prstGeom prst="straightConnector1">
+            <a:avLst/>
+          </a:prstGeom>
+          <a:ln w="57150">
+            <a:tailEnd type="triangle"/>
+          </a:ln>
+        </p:spPr>
+        <p:style>
+          <a:lnRef idx="3">
+            <a:schemeClr val="accent2"/>
+          </a:lnRef>
+          <a:fillRef idx="0">
+            <a:schemeClr val="accent2"/>
+          </a:fillRef>
+          <a:effectRef idx="2">
+            <a:schemeClr val="accent2"/>
+          </a:effectRef>
+          <a:fontRef idx="minor">
+            <a:schemeClr val="tx1"/>
+          </a:fontRef>
+        </p:style>
+      </p:cxnSp>
+    </p:spTree>
+    <p:extLst>
+      <p:ext uri="{BB962C8B-B14F-4D97-AF65-F5344CB8AC3E}">
+        <p14:creationId xmlns:p14="http://schemas.microsoft.com/office/powerpoint/2010/main" val="594051239"/>
+      </p:ext>
+    </p:extLst>
+  </p:cSld>
+  <p:clrMapOvr>
+    <a:masterClrMapping/>
+  </p:clrMapOvr>
+</p:sld>
+</file>
+
+<file path=ppt/slides/slide5.xml><?xml version="1.0" encoding="utf-8"?>
+<p:sld xmlns:a="http://schemas.openxmlformats.org/drawingml/2006/main" xmlns:r="http://schemas.openxmlformats.org/officeDocument/2006/relationships" xmlns:p="http://schemas.openxmlformats.org/presentationml/2006/main">
+  <p:cSld>
+    <p:spTree>
+      <p:nvGrpSpPr>
+        <p:cNvPr id="1" name=""/>
+        <p:cNvGrpSpPr/>
+        <p:nvPr/>
+      </p:nvGrpSpPr>
+      <p:grpSpPr>
+        <a:xfrm>
+          <a:off x="0" y="0"/>
+          <a:ext cx="0" cy="0"/>
+          <a:chOff x="0" y="0"/>
+          <a:chExt cx="0" cy="0"/>
+        </a:xfrm>
+      </p:grpSpPr>
+      <p:sp>
+        <p:nvSpPr>
+          <p:cNvPr id="4" name="Rounded Rectangle 3">
+            <a:extLst>
+              <a:ext uri="{FF2B5EF4-FFF2-40B4-BE49-F238E27FC236}">
+                <a16:creationId xmlns:a16="http://schemas.microsoft.com/office/drawing/2014/main" id="{28C86D09-2AB2-BA4E-B606-F9500AF6F233}"/>
+              </a:ext>
+            </a:extLst>
+          </p:cNvPr>
+          <p:cNvSpPr/>
+          <p:nvPr/>
+        </p:nvSpPr>
+        <p:spPr>
+          <a:xfrm>
+            <a:off x="1224951" y="483079"/>
+            <a:ext cx="9903124" cy="5589917"/>
+          </a:xfrm>
+          <a:prstGeom prst="roundRect">
+            <a:avLst/>
+          </a:prstGeom>
+        </p:spPr>
+        <p:style>
+          <a:lnRef idx="2">
+            <a:schemeClr val="accent1">
+              <a:shade val="50000"/>
+            </a:schemeClr>
+          </a:lnRef>
+          <a:fillRef idx="1">
+            <a:schemeClr val="accent1"/>
+          </a:fillRef>
+          <a:effectRef idx="0">
+            <a:schemeClr val="accent1"/>
+          </a:effectRef>
+          <a:fontRef idx="minor">
+            <a:schemeClr val="lt1"/>
+          </a:fontRef>
+        </p:style>
+        <p:txBody>
+          <a:bodyPr rtlCol="0" anchor="ctr"/>
+          <a:lstStyle/>
+          <a:p>
+            <a:pPr algn="ctr"/>
+            <a:r>
+              <a:rPr lang="en-FR" dirty="0"/>
+              <a:t>Contexte Spring</a:t>
+            </a:r>
+          </a:p>
+        </p:txBody>
+      </p:sp>
+      <p:sp>
+        <p:nvSpPr>
+          <p:cNvPr id="8" name="TextBox 7">
+            <a:extLst>
+              <a:ext uri="{FF2B5EF4-FFF2-40B4-BE49-F238E27FC236}">
+                <a16:creationId xmlns:a16="http://schemas.microsoft.com/office/drawing/2014/main" id="{E04DD0A2-2A2A-DB48-A7C6-A00A8E47D158}"/>
+              </a:ext>
+            </a:extLst>
+          </p:cNvPr>
+          <p:cNvSpPr txBox="1"/>
+          <p:nvPr/>
+        </p:nvSpPr>
+        <p:spPr>
+          <a:xfrm>
+            <a:off x="1026543" y="6251441"/>
+            <a:ext cx="4902561" cy="369332"/>
+          </a:xfrm>
+          <a:prstGeom prst="rect">
+            <a:avLst/>
+          </a:prstGeom>
+          <a:noFill/>
+        </p:spPr>
+        <p:txBody>
+          <a:bodyPr wrap="none" rtlCol="0">
+            <a:spAutoFit/>
+          </a:bodyPr>
+          <a:lstStyle/>
+          <a:p>
+            <a:r>
+              <a:rPr lang="en-FR" i="1" dirty="0"/>
+              <a:t>Bean = Objet qui se trouve dans le contexte Spring</a:t>
+            </a:r>
+          </a:p>
+        </p:txBody>
+      </p:sp>
+      <p:sp>
+        <p:nvSpPr>
+          <p:cNvPr id="9" name="Oval 8">
+            <a:extLst>
+              <a:ext uri="{FF2B5EF4-FFF2-40B4-BE49-F238E27FC236}">
+                <a16:creationId xmlns:a16="http://schemas.microsoft.com/office/drawing/2014/main" id="{9794CF54-A303-2646-B379-A142C4D5D947}"/>
+              </a:ext>
+            </a:extLst>
+          </p:cNvPr>
+          <p:cNvSpPr/>
+          <p:nvPr/>
+        </p:nvSpPr>
+        <p:spPr>
+          <a:xfrm>
+            <a:off x="5276490" y="1178943"/>
+            <a:ext cx="2035834" cy="715993"/>
+          </a:xfrm>
+          <a:prstGeom prst="ellipse">
+            <a:avLst/>
+          </a:prstGeom>
+        </p:spPr>
+        <p:style>
+          <a:lnRef idx="2">
+            <a:schemeClr val="accent4">
+              <a:shade val="50000"/>
+            </a:schemeClr>
+          </a:lnRef>
+          <a:fillRef idx="1">
+            <a:schemeClr val="accent4"/>
+          </a:fillRef>
+          <a:effectRef idx="0">
+            <a:schemeClr val="accent4"/>
+          </a:effectRef>
+          <a:fontRef idx="minor">
+            <a:schemeClr val="lt1"/>
+          </a:fontRef>
+        </p:style>
+        <p:txBody>
+          <a:bodyPr rtlCol="0" anchor="ctr"/>
+          <a:lstStyle/>
+          <a:p>
+            <a:pPr algn="ctr"/>
+            <a:r>
+              <a:rPr lang="en-FR" dirty="0"/>
+              <a:t>Scanner</a:t>
+            </a:r>
+          </a:p>
+        </p:txBody>
+      </p:sp>
+      <p:sp>
+        <p:nvSpPr>
+          <p:cNvPr id="11" name="Oval 10">
+            <a:extLst>
+              <a:ext uri="{FF2B5EF4-FFF2-40B4-BE49-F238E27FC236}">
+                <a16:creationId xmlns:a16="http://schemas.microsoft.com/office/drawing/2014/main" id="{D76FF5E2-08BC-D544-ACAC-910A1C0D8964}"/>
+              </a:ext>
+            </a:extLst>
+          </p:cNvPr>
+          <p:cNvSpPr/>
+          <p:nvPr/>
+        </p:nvSpPr>
+        <p:spPr>
+          <a:xfrm>
+            <a:off x="2055962" y="1779916"/>
+            <a:ext cx="2035834" cy="715993"/>
+          </a:xfrm>
+          <a:prstGeom prst="ellipse">
+            <a:avLst/>
+          </a:prstGeom>
+        </p:spPr>
+        <p:style>
+          <a:lnRef idx="2">
+            <a:schemeClr val="accent4">
+              <a:shade val="50000"/>
+            </a:schemeClr>
+          </a:lnRef>
+          <a:fillRef idx="1">
+            <a:schemeClr val="accent4"/>
+          </a:fillRef>
+          <a:effectRef idx="0">
+            <a:schemeClr val="accent4"/>
+          </a:effectRef>
+          <a:fontRef idx="minor">
+            <a:schemeClr val="lt1"/>
+          </a:fontRef>
+        </p:style>
+        <p:txBody>
+          <a:bodyPr rtlCol="0" anchor="ctr"/>
+          <a:lstStyle/>
+          <a:p>
+            <a:pPr algn="ctr"/>
+            <a:r>
+              <a:rPr lang="en-FR" dirty="0"/>
+              <a:t>Menu</a:t>
+            </a:r>
+          </a:p>
+        </p:txBody>
+      </p:sp>
+      <p:cxnSp>
+        <p:nvCxnSpPr>
+          <p:cNvPr id="12" name="Straight Arrow Connector 11">
+            <a:extLst>
+              <a:ext uri="{FF2B5EF4-FFF2-40B4-BE49-F238E27FC236}">
+                <a16:creationId xmlns:a16="http://schemas.microsoft.com/office/drawing/2014/main" id="{26654912-7BA3-B048-9734-FA1CDA415803}"/>
+              </a:ext>
+            </a:extLst>
+          </p:cNvPr>
+          <p:cNvCxnSpPr>
+            <a:cxnSpLocks/>
+          </p:cNvCxnSpPr>
+          <p:nvPr/>
+        </p:nvCxnSpPr>
+        <p:spPr>
+          <a:xfrm flipV="1">
+            <a:off x="3861759" y="1601471"/>
+            <a:ext cx="1736784" cy="536441"/>
+          </a:xfrm>
+          <a:prstGeom prst="straightConnector1">
+            <a:avLst/>
+          </a:prstGeom>
+          <a:ln w="57150">
+            <a:tailEnd type="triangle"/>
+          </a:ln>
+        </p:spPr>
+        <p:style>
+          <a:lnRef idx="3">
+            <a:schemeClr val="accent2"/>
+          </a:lnRef>
+          <a:fillRef idx="0">
+            <a:schemeClr val="accent2"/>
+          </a:fillRef>
+          <a:effectRef idx="2">
+            <a:schemeClr val="accent2"/>
+          </a:effectRef>
+          <a:fontRef idx="minor">
+            <a:schemeClr val="tx1"/>
+          </a:fontRef>
+        </p:style>
+      </p:cxnSp>
+      <p:sp>
+        <p:nvSpPr>
+          <p:cNvPr id="13" name="Oval 12">
+            <a:extLst>
+              <a:ext uri="{FF2B5EF4-FFF2-40B4-BE49-F238E27FC236}">
+                <a16:creationId xmlns:a16="http://schemas.microsoft.com/office/drawing/2014/main" id="{27E9401F-EA92-1C40-AF9B-9A86D7EA80F6}"/>
+              </a:ext>
+            </a:extLst>
+          </p:cNvPr>
+          <p:cNvSpPr/>
+          <p:nvPr/>
+        </p:nvSpPr>
+        <p:spPr>
+          <a:xfrm>
+            <a:off x="2843842" y="4117675"/>
+            <a:ext cx="3315418" cy="715993"/>
+          </a:xfrm>
+          <a:prstGeom prst="ellipse">
+            <a:avLst/>
+          </a:prstGeom>
+        </p:spPr>
+        <p:style>
+          <a:lnRef idx="2">
+            <a:schemeClr val="accent4">
+              <a:shade val="50000"/>
+            </a:schemeClr>
+          </a:lnRef>
+          <a:fillRef idx="1">
+            <a:schemeClr val="accent4"/>
+          </a:fillRef>
+          <a:effectRef idx="0">
+            <a:schemeClr val="accent4"/>
+          </a:effectRef>
+          <a:fontRef idx="minor">
+            <a:schemeClr val="lt1"/>
+          </a:fontRef>
+        </p:style>
+        <p:txBody>
+          <a:bodyPr rtlCol="0" anchor="ctr"/>
+          <a:lstStyle/>
+          <a:p>
+            <a:pPr algn="ctr"/>
+            <a:r>
+              <a:rPr lang="en-FR" dirty="0"/>
+              <a:t>PlatServiceVersion2</a:t>
+            </a:r>
+          </a:p>
+        </p:txBody>
+      </p:sp>
+      <p:cxnSp>
+        <p:nvCxnSpPr>
+          <p:cNvPr id="14" name="Straight Arrow Connector 13">
+            <a:extLst>
+              <a:ext uri="{FF2B5EF4-FFF2-40B4-BE49-F238E27FC236}">
+                <a16:creationId xmlns:a16="http://schemas.microsoft.com/office/drawing/2014/main" id="{D83307AF-84ED-804D-8EC4-41EC2919B180}"/>
+              </a:ext>
+            </a:extLst>
+          </p:cNvPr>
+          <p:cNvCxnSpPr>
+            <a:cxnSpLocks/>
+          </p:cNvCxnSpPr>
+          <p:nvPr/>
+        </p:nvCxnSpPr>
+        <p:spPr>
+          <a:xfrm>
+            <a:off x="3477823" y="2376743"/>
+            <a:ext cx="861264" cy="1983908"/>
+          </a:xfrm>
+          <a:prstGeom prst="straightConnector1">
+            <a:avLst/>
+          </a:prstGeom>
+          <a:ln w="57150">
+            <a:tailEnd type="triangle"/>
+          </a:ln>
+        </p:spPr>
+        <p:style>
+          <a:lnRef idx="3">
+            <a:schemeClr val="accent2"/>
+          </a:lnRef>
+          <a:fillRef idx="0">
+            <a:schemeClr val="accent2"/>
+          </a:fillRef>
+          <a:effectRef idx="2">
+            <a:schemeClr val="accent2"/>
+          </a:effectRef>
+          <a:fontRef idx="minor">
+            <a:schemeClr val="tx1"/>
+          </a:fontRef>
+        </p:style>
+      </p:cxnSp>
+      <p:sp>
+        <p:nvSpPr>
+          <p:cNvPr id="15" name="Oval 14">
+            <a:extLst>
+              <a:ext uri="{FF2B5EF4-FFF2-40B4-BE49-F238E27FC236}">
+                <a16:creationId xmlns:a16="http://schemas.microsoft.com/office/drawing/2014/main" id="{05159BBF-C810-A549-A617-16971E5A8146}"/>
+              </a:ext>
+            </a:extLst>
+          </p:cNvPr>
+          <p:cNvSpPr/>
+          <p:nvPr/>
+        </p:nvSpPr>
+        <p:spPr>
+          <a:xfrm>
+            <a:off x="6816244" y="4106338"/>
+            <a:ext cx="3315418" cy="715993"/>
+          </a:xfrm>
+          <a:prstGeom prst="ellipse">
+            <a:avLst/>
+          </a:prstGeom>
+        </p:spPr>
+        <p:style>
+          <a:lnRef idx="2">
+            <a:schemeClr val="accent4">
+              <a:shade val="50000"/>
+            </a:schemeClr>
+          </a:lnRef>
+          <a:fillRef idx="1">
+            <a:schemeClr val="accent4"/>
+          </a:fillRef>
+          <a:effectRef idx="0">
+            <a:schemeClr val="accent4"/>
+          </a:effectRef>
+          <a:fontRef idx="minor">
+            <a:schemeClr val="lt1"/>
+          </a:fontRef>
+        </p:style>
+        <p:txBody>
+          <a:bodyPr rtlCol="0" anchor="ctr"/>
+          <a:lstStyle/>
+          <a:p>
+            <a:pPr algn="ctr"/>
+            <a:r>
+              <a:rPr lang="en-FR" dirty="0"/>
+              <a:t>PlatDaoMemoire</a:t>
+            </a:r>
+          </a:p>
+        </p:txBody>
+      </p:sp>
+      <p:cxnSp>
+        <p:nvCxnSpPr>
+          <p:cNvPr id="16" name="Straight Arrow Connector 15">
+            <a:extLst>
+              <a:ext uri="{FF2B5EF4-FFF2-40B4-BE49-F238E27FC236}">
+                <a16:creationId xmlns:a16="http://schemas.microsoft.com/office/drawing/2014/main" id="{5E571479-487A-A043-9587-81EF2D55B44D}"/>
+              </a:ext>
+            </a:extLst>
+          </p:cNvPr>
+          <p:cNvCxnSpPr>
+            <a:cxnSpLocks/>
+          </p:cNvCxnSpPr>
+          <p:nvPr/>
+        </p:nvCxnSpPr>
+        <p:spPr>
+          <a:xfrm>
+            <a:off x="5819831" y="4455710"/>
+            <a:ext cx="1661457" cy="24107"/>
+          </a:xfrm>
+          <a:prstGeom prst="straightConnector1">
+            <a:avLst/>
+          </a:prstGeom>
+          <a:ln w="57150">
+            <a:tailEnd type="triangle"/>
+          </a:ln>
+        </p:spPr>
+        <p:style>
+          <a:lnRef idx="3">
+            <a:schemeClr val="accent2"/>
+          </a:lnRef>
+          <a:fillRef idx="0">
+            <a:schemeClr val="accent2"/>
+          </a:fillRef>
+          <a:effectRef idx="2">
+            <a:schemeClr val="accent2"/>
+          </a:effectRef>
+          <a:fontRef idx="minor">
+            <a:schemeClr val="tx1"/>
+          </a:fontRef>
+        </p:style>
+      </p:cxnSp>
+    </p:spTree>
+    <p:extLst>
+      <p:ext uri="{BB962C8B-B14F-4D97-AF65-F5344CB8AC3E}">
+        <p14:creationId xmlns:p14="http://schemas.microsoft.com/office/powerpoint/2010/main" val="1302849932"/>
+      </p:ext>
+    </p:extLst>
+  </p:cSld>
+  <p:clrMapOvr>
+    <a:masterClrMapping/>
+  </p:clrMapOvr>
+</p:sld>
+</file>
+
+<file path=ppt/slides/slide6.xml><?xml version="1.0" encoding="utf-8"?>
+<p:sld xmlns:a="http://schemas.openxmlformats.org/drawingml/2006/main" xmlns:r="http://schemas.openxmlformats.org/officeDocument/2006/relationships" xmlns:p="http://schemas.openxmlformats.org/presentationml/2006/main">
+  <p:cSld>
+    <p:spTree>
+      <p:nvGrpSpPr>
+        <p:cNvPr id="1" name=""/>
+        <p:cNvGrpSpPr/>
+        <p:nvPr/>
+      </p:nvGrpSpPr>
+      <p:grpSpPr>
+        <a:xfrm>
+          <a:off x="0" y="0"/>
+          <a:ext cx="0" cy="0"/>
+          <a:chOff x="0" y="0"/>
+          <a:chExt cx="0" cy="0"/>
+        </a:xfrm>
+      </p:grpSpPr>
+      <p:sp>
+        <p:nvSpPr>
+          <p:cNvPr id="4" name="Rounded Rectangle 3">
+            <a:extLst>
+              <a:ext uri="{FF2B5EF4-FFF2-40B4-BE49-F238E27FC236}">
+                <a16:creationId xmlns:a16="http://schemas.microsoft.com/office/drawing/2014/main" id="{28C86D09-2AB2-BA4E-B606-F9500AF6F233}"/>
+              </a:ext>
+            </a:extLst>
+          </p:cNvPr>
+          <p:cNvSpPr/>
+          <p:nvPr/>
+        </p:nvSpPr>
+        <p:spPr>
+          <a:xfrm>
+            <a:off x="1224951" y="483079"/>
+            <a:ext cx="9903124" cy="5589917"/>
+          </a:xfrm>
+          <a:prstGeom prst="roundRect">
+            <a:avLst/>
+          </a:prstGeom>
+        </p:spPr>
+        <p:style>
+          <a:lnRef idx="2">
+            <a:schemeClr val="accent1">
+              <a:shade val="50000"/>
+            </a:schemeClr>
+          </a:lnRef>
+          <a:fillRef idx="1">
+            <a:schemeClr val="accent1"/>
+          </a:fillRef>
+          <a:effectRef idx="0">
+            <a:schemeClr val="accent1"/>
+          </a:effectRef>
+          <a:fontRef idx="minor">
+            <a:schemeClr val="lt1"/>
+          </a:fontRef>
+        </p:style>
+        <p:txBody>
+          <a:bodyPr rtlCol="0" anchor="ctr"/>
+          <a:lstStyle/>
+          <a:p>
+            <a:pPr algn="ctr"/>
+            <a:r>
+              <a:rPr lang="en-FR" dirty="0"/>
+              <a:t>Contexte Spring</a:t>
+            </a:r>
+          </a:p>
+        </p:txBody>
+      </p:sp>
+      <p:sp>
+        <p:nvSpPr>
+          <p:cNvPr id="8" name="TextBox 7">
+            <a:extLst>
+              <a:ext uri="{FF2B5EF4-FFF2-40B4-BE49-F238E27FC236}">
+                <a16:creationId xmlns:a16="http://schemas.microsoft.com/office/drawing/2014/main" id="{E04DD0A2-2A2A-DB48-A7C6-A00A8E47D158}"/>
+              </a:ext>
+            </a:extLst>
+          </p:cNvPr>
+          <p:cNvSpPr txBox="1"/>
+          <p:nvPr/>
+        </p:nvSpPr>
+        <p:spPr>
+          <a:xfrm>
+            <a:off x="1026543" y="6251441"/>
+            <a:ext cx="4902561" cy="369332"/>
+          </a:xfrm>
+          <a:prstGeom prst="rect">
+            <a:avLst/>
+          </a:prstGeom>
+          <a:noFill/>
+        </p:spPr>
+        <p:txBody>
+          <a:bodyPr wrap="none" rtlCol="0">
+            <a:spAutoFit/>
+          </a:bodyPr>
+          <a:lstStyle/>
+          <a:p>
+            <a:r>
+              <a:rPr lang="en-FR" i="1" dirty="0"/>
+              <a:t>Bean = Objet qui se trouve dans le contexte Spring</a:t>
+            </a:r>
+          </a:p>
+        </p:txBody>
+      </p:sp>
+      <p:sp>
+        <p:nvSpPr>
+          <p:cNvPr id="9" name="Oval 8">
+            <a:extLst>
+              <a:ext uri="{FF2B5EF4-FFF2-40B4-BE49-F238E27FC236}">
+                <a16:creationId xmlns:a16="http://schemas.microsoft.com/office/drawing/2014/main" id="{9794CF54-A303-2646-B379-A142C4D5D947}"/>
+              </a:ext>
+            </a:extLst>
+          </p:cNvPr>
+          <p:cNvSpPr/>
+          <p:nvPr/>
+        </p:nvSpPr>
+        <p:spPr>
+          <a:xfrm>
+            <a:off x="5276490" y="1178943"/>
+            <a:ext cx="2035834" cy="715993"/>
+          </a:xfrm>
+          <a:prstGeom prst="ellipse">
+            <a:avLst/>
+          </a:prstGeom>
+        </p:spPr>
+        <p:style>
+          <a:lnRef idx="2">
+            <a:schemeClr val="accent4">
+              <a:shade val="50000"/>
+            </a:schemeClr>
+          </a:lnRef>
+          <a:fillRef idx="1">
+            <a:schemeClr val="accent4"/>
+          </a:fillRef>
+          <a:effectRef idx="0">
+            <a:schemeClr val="accent4"/>
+          </a:effectRef>
+          <a:fontRef idx="minor">
+            <a:schemeClr val="lt1"/>
+          </a:fontRef>
+        </p:style>
+        <p:txBody>
+          <a:bodyPr rtlCol="0" anchor="ctr"/>
+          <a:lstStyle/>
+          <a:p>
+            <a:pPr algn="ctr"/>
+            <a:r>
+              <a:rPr lang="en-FR" dirty="0"/>
+              <a:t>Scanner</a:t>
+            </a:r>
+          </a:p>
+        </p:txBody>
+      </p:sp>
+      <p:sp>
+        <p:nvSpPr>
+          <p:cNvPr id="11" name="Oval 10">
+            <a:extLst>
+              <a:ext uri="{FF2B5EF4-FFF2-40B4-BE49-F238E27FC236}">
+                <a16:creationId xmlns:a16="http://schemas.microsoft.com/office/drawing/2014/main" id="{D76FF5E2-08BC-D544-ACAC-910A1C0D8964}"/>
+              </a:ext>
+            </a:extLst>
+          </p:cNvPr>
+          <p:cNvSpPr/>
+          <p:nvPr/>
+        </p:nvSpPr>
+        <p:spPr>
+          <a:xfrm>
+            <a:off x="2055962" y="1779916"/>
+            <a:ext cx="2352136" cy="715993"/>
+          </a:xfrm>
+          <a:prstGeom prst="ellipse">
+            <a:avLst/>
+          </a:prstGeom>
+        </p:spPr>
+        <p:style>
+          <a:lnRef idx="2">
+            <a:schemeClr val="accent4">
+              <a:shade val="50000"/>
+            </a:schemeClr>
+          </a:lnRef>
+          <a:fillRef idx="1">
+            <a:schemeClr val="accent4"/>
+          </a:fillRef>
+          <a:effectRef idx="0">
+            <a:schemeClr val="accent4"/>
+          </a:effectRef>
+          <a:fontRef idx="minor">
+            <a:schemeClr val="lt1"/>
+          </a:fontRef>
+        </p:style>
+        <p:txBody>
+          <a:bodyPr rtlCol="0" anchor="ctr"/>
+          <a:lstStyle/>
+          <a:p>
+            <a:pPr algn="ctr"/>
+            <a:r>
+              <a:rPr lang="en-FR" dirty="0"/>
+              <a:t>ScannerConfig</a:t>
+            </a:r>
+          </a:p>
+        </p:txBody>
+      </p:sp>
+      <p:cxnSp>
+        <p:nvCxnSpPr>
+          <p:cNvPr id="17" name="Straight Arrow Connector 16">
+            <a:extLst>
+              <a:ext uri="{FF2B5EF4-FFF2-40B4-BE49-F238E27FC236}">
+                <a16:creationId xmlns:a16="http://schemas.microsoft.com/office/drawing/2014/main" id="{5291895E-1A3C-2D44-BD69-B5228177D539}"/>
+              </a:ext>
+            </a:extLst>
+          </p:cNvPr>
+          <p:cNvCxnSpPr>
+            <a:cxnSpLocks/>
+          </p:cNvCxnSpPr>
+          <p:nvPr/>
+        </p:nvCxnSpPr>
+        <p:spPr>
+          <a:xfrm flipV="1">
+            <a:off x="3252158" y="1779916"/>
+            <a:ext cx="2843842" cy="1377352"/>
+          </a:xfrm>
+          <a:prstGeom prst="straightConnector1">
+            <a:avLst/>
+          </a:prstGeom>
+          <a:ln w="57150">
+            <a:tailEnd type="triangle"/>
+          </a:ln>
+        </p:spPr>
+        <p:style>
+          <a:lnRef idx="3">
+            <a:schemeClr val="accent2"/>
+          </a:lnRef>
+          <a:fillRef idx="0">
+            <a:schemeClr val="accent2"/>
+          </a:fillRef>
+          <a:effectRef idx="2">
+            <a:schemeClr val="accent2"/>
+          </a:effectRef>
+          <a:fontRef idx="minor">
+            <a:schemeClr val="tx1"/>
+          </a:fontRef>
+        </p:style>
+      </p:cxnSp>
+      <p:sp>
+        <p:nvSpPr>
+          <p:cNvPr id="18" name="Oval 17">
+            <a:extLst>
+              <a:ext uri="{FF2B5EF4-FFF2-40B4-BE49-F238E27FC236}">
+                <a16:creationId xmlns:a16="http://schemas.microsoft.com/office/drawing/2014/main" id="{D55C30CB-1A87-A248-8808-668FFDE0D9B8}"/>
+              </a:ext>
+            </a:extLst>
+          </p:cNvPr>
+          <p:cNvSpPr/>
+          <p:nvPr/>
+        </p:nvSpPr>
+        <p:spPr>
+          <a:xfrm>
+            <a:off x="2055962" y="2802145"/>
+            <a:ext cx="2035834" cy="715993"/>
+          </a:xfrm>
+          <a:prstGeom prst="ellipse">
+            <a:avLst/>
+          </a:prstGeom>
+        </p:spPr>
+        <p:style>
+          <a:lnRef idx="2">
+            <a:schemeClr val="accent4">
+              <a:shade val="50000"/>
+            </a:schemeClr>
+          </a:lnRef>
+          <a:fillRef idx="1">
+            <a:schemeClr val="accent4"/>
+          </a:fillRef>
+          <a:effectRef idx="0">
+            <a:schemeClr val="accent4"/>
+          </a:effectRef>
+          <a:fontRef idx="minor">
+            <a:schemeClr val="lt1"/>
+          </a:fontRef>
+        </p:style>
+        <p:txBody>
+          <a:bodyPr rtlCol="0" anchor="ctr"/>
+          <a:lstStyle/>
+          <a:p>
+            <a:pPr algn="ctr"/>
+            <a:r>
+              <a:rPr lang="en-FR" dirty="0"/>
+              <a:t>Menu</a:t>
+            </a:r>
+          </a:p>
+        </p:txBody>
+      </p:sp>
+      <p:sp>
+        <p:nvSpPr>
+          <p:cNvPr id="21" name="Oval 20">
+            <a:extLst>
+              <a:ext uri="{FF2B5EF4-FFF2-40B4-BE49-F238E27FC236}">
+                <a16:creationId xmlns:a16="http://schemas.microsoft.com/office/drawing/2014/main" id="{D2D9E4B8-86B0-DF42-AF8F-D3B8F9A14121}"/>
+              </a:ext>
+            </a:extLst>
+          </p:cNvPr>
+          <p:cNvSpPr/>
+          <p:nvPr/>
+        </p:nvSpPr>
+        <p:spPr>
+          <a:xfrm>
+            <a:off x="7205932" y="2193264"/>
+            <a:ext cx="2035834" cy="715993"/>
+          </a:xfrm>
+          <a:prstGeom prst="ellipse">
+            <a:avLst/>
+          </a:prstGeom>
+        </p:spPr>
+        <p:style>
+          <a:lnRef idx="2">
+            <a:schemeClr val="accent4">
+              <a:shade val="50000"/>
+            </a:schemeClr>
+          </a:lnRef>
+          <a:fillRef idx="1">
+            <a:schemeClr val="accent4"/>
+          </a:fillRef>
+          <a:effectRef idx="0">
+            <a:schemeClr val="accent4"/>
+          </a:effectRef>
+          <a:fontRef idx="minor">
+            <a:schemeClr val="lt1"/>
+          </a:fontRef>
+        </p:style>
+        <p:txBody>
+          <a:bodyPr rtlCol="0" anchor="ctr"/>
+          <a:lstStyle/>
+          <a:p>
+            <a:pPr algn="ctr"/>
+            <a:r>
+              <a:rPr lang="en-FR" dirty="0"/>
+              <a:t> AjouterPlat</a:t>
+            </a:r>
+          </a:p>
+        </p:txBody>
+      </p:sp>
+      <p:cxnSp>
+        <p:nvCxnSpPr>
+          <p:cNvPr id="22" name="Straight Arrow Connector 21">
+            <a:extLst>
+              <a:ext uri="{FF2B5EF4-FFF2-40B4-BE49-F238E27FC236}">
+                <a16:creationId xmlns:a16="http://schemas.microsoft.com/office/drawing/2014/main" id="{06D67BD0-5721-4A41-9571-233B42A0B9A7}"/>
+              </a:ext>
+            </a:extLst>
+          </p:cNvPr>
+          <p:cNvCxnSpPr>
+            <a:cxnSpLocks/>
+          </p:cNvCxnSpPr>
+          <p:nvPr/>
+        </p:nvCxnSpPr>
+        <p:spPr>
+          <a:xfrm flipH="1" flipV="1">
+            <a:off x="6466935" y="1779916"/>
+            <a:ext cx="1713781" cy="658484"/>
+          </a:xfrm>
+          <a:prstGeom prst="straightConnector1">
+            <a:avLst/>
+          </a:prstGeom>
+          <a:ln w="57150">
+            <a:tailEnd type="triangle"/>
+          </a:ln>
+        </p:spPr>
+        <p:style>
+          <a:lnRef idx="3">
+            <a:schemeClr val="accent2"/>
+          </a:lnRef>
+          <a:fillRef idx="0">
+            <a:schemeClr val="accent2"/>
+          </a:fillRef>
+          <a:effectRef idx="2">
+            <a:schemeClr val="accent2"/>
+          </a:effectRef>
+          <a:fontRef idx="minor">
+            <a:schemeClr val="tx1"/>
+          </a:fontRef>
+        </p:style>
+      </p:cxnSp>
+      <p:sp>
+        <p:nvSpPr>
+          <p:cNvPr id="23" name="Oval 22">
+            <a:extLst>
+              <a:ext uri="{FF2B5EF4-FFF2-40B4-BE49-F238E27FC236}">
+                <a16:creationId xmlns:a16="http://schemas.microsoft.com/office/drawing/2014/main" id="{7C8D7F4B-B282-4649-826A-57F69EF19938}"/>
+              </a:ext>
+            </a:extLst>
+          </p:cNvPr>
+          <p:cNvSpPr/>
+          <p:nvPr/>
+        </p:nvSpPr>
+        <p:spPr>
+          <a:xfrm>
+            <a:off x="4747404" y="4096108"/>
+            <a:ext cx="3275162" cy="715993"/>
+          </a:xfrm>
+          <a:prstGeom prst="ellipse">
+            <a:avLst/>
+          </a:prstGeom>
+        </p:spPr>
+        <p:style>
+          <a:lnRef idx="2">
+            <a:schemeClr val="accent4">
+              <a:shade val="50000"/>
+            </a:schemeClr>
+          </a:lnRef>
+          <a:fillRef idx="1">
+            <a:schemeClr val="accent4"/>
+          </a:fillRef>
+          <a:effectRef idx="0">
+            <a:schemeClr val="accent4"/>
+          </a:effectRef>
+          <a:fontRef idx="minor">
+            <a:schemeClr val="lt1"/>
+          </a:fontRef>
+        </p:style>
+        <p:txBody>
+          <a:bodyPr rtlCol="0" anchor="ctr"/>
+          <a:lstStyle/>
+          <a:p>
+            <a:pPr algn="ctr"/>
+            <a:r>
+              <a:rPr lang="en-FR" dirty="0"/>
+              <a:t> PlatServiceVersion1</a:t>
+            </a:r>
+          </a:p>
+        </p:txBody>
+      </p:sp>
+      <p:sp>
+        <p:nvSpPr>
+          <p:cNvPr id="24" name="Oval 23">
+            <a:extLst>
+              <a:ext uri="{FF2B5EF4-FFF2-40B4-BE49-F238E27FC236}">
+                <a16:creationId xmlns:a16="http://schemas.microsoft.com/office/drawing/2014/main" id="{D6BD2FB1-A0DC-564D-886B-D1DBFADEADE0}"/>
+              </a:ext>
+            </a:extLst>
+          </p:cNvPr>
+          <p:cNvSpPr/>
+          <p:nvPr/>
+        </p:nvSpPr>
+        <p:spPr>
+          <a:xfrm>
+            <a:off x="6763110" y="5084552"/>
+            <a:ext cx="3275162" cy="715993"/>
+          </a:xfrm>
+          <a:prstGeom prst="ellipse">
+            <a:avLst/>
+          </a:prstGeom>
+        </p:spPr>
+        <p:style>
+          <a:lnRef idx="2">
+            <a:schemeClr val="accent4">
+              <a:shade val="50000"/>
+            </a:schemeClr>
+          </a:lnRef>
+          <a:fillRef idx="1">
+            <a:schemeClr val="accent4"/>
+          </a:fillRef>
+          <a:effectRef idx="0">
+            <a:schemeClr val="accent4"/>
+          </a:effectRef>
+          <a:fontRef idx="minor">
+            <a:schemeClr val="lt1"/>
+          </a:fontRef>
+        </p:style>
+        <p:txBody>
+          <a:bodyPr rtlCol="0" anchor="ctr"/>
+          <a:lstStyle/>
+          <a:p>
+            <a:pPr algn="ctr"/>
+            <a:r>
+              <a:rPr lang="en-FR" dirty="0"/>
+              <a:t>PlatDaoMemoire</a:t>
+            </a:r>
+          </a:p>
+        </p:txBody>
+      </p:sp>
+      <p:cxnSp>
+        <p:nvCxnSpPr>
+          <p:cNvPr id="25" name="Straight Arrow Connector 24">
+            <a:extLst>
+              <a:ext uri="{FF2B5EF4-FFF2-40B4-BE49-F238E27FC236}">
+                <a16:creationId xmlns:a16="http://schemas.microsoft.com/office/drawing/2014/main" id="{EE2EF0D8-6DE9-9A48-87EC-B702BA2F6076}"/>
+              </a:ext>
+            </a:extLst>
+          </p:cNvPr>
+          <p:cNvCxnSpPr>
+            <a:cxnSpLocks/>
+          </p:cNvCxnSpPr>
+          <p:nvPr/>
+        </p:nvCxnSpPr>
+        <p:spPr>
+          <a:xfrm flipH="1">
+            <a:off x="7013275" y="2833776"/>
+            <a:ext cx="1311216" cy="1442215"/>
+          </a:xfrm>
+          <a:prstGeom prst="straightConnector1">
+            <a:avLst/>
+          </a:prstGeom>
+          <a:ln w="57150">
+            <a:tailEnd type="triangle"/>
+          </a:ln>
+        </p:spPr>
+        <p:style>
+          <a:lnRef idx="3">
+            <a:schemeClr val="accent2"/>
+          </a:lnRef>
+          <a:fillRef idx="0">
+            <a:schemeClr val="accent2"/>
+          </a:fillRef>
+          <a:effectRef idx="2">
+            <a:schemeClr val="accent2"/>
+          </a:effectRef>
+          <a:fontRef idx="minor">
+            <a:schemeClr val="tx1"/>
+          </a:fontRef>
+        </p:style>
+      </p:cxnSp>
+      <p:cxnSp>
+        <p:nvCxnSpPr>
+          <p:cNvPr id="26" name="Straight Arrow Connector 25">
+            <a:extLst>
+              <a:ext uri="{FF2B5EF4-FFF2-40B4-BE49-F238E27FC236}">
+                <a16:creationId xmlns:a16="http://schemas.microsoft.com/office/drawing/2014/main" id="{EAC3CFC8-E73D-754E-B7FA-69329102EF94}"/>
+              </a:ext>
+            </a:extLst>
+          </p:cNvPr>
+          <p:cNvCxnSpPr>
+            <a:cxnSpLocks/>
+          </p:cNvCxnSpPr>
+          <p:nvPr/>
+        </p:nvCxnSpPr>
+        <p:spPr>
+          <a:xfrm>
+            <a:off x="3367178" y="3382271"/>
+            <a:ext cx="1811548" cy="1071833"/>
+          </a:xfrm>
+          <a:prstGeom prst="straightConnector1">
+            <a:avLst/>
+          </a:prstGeom>
+          <a:ln w="57150">
+            <a:tailEnd type="triangle"/>
+          </a:ln>
+        </p:spPr>
+        <p:style>
+          <a:lnRef idx="3">
+            <a:schemeClr val="accent2"/>
+          </a:lnRef>
+          <a:fillRef idx="0">
+            <a:schemeClr val="accent2"/>
+          </a:fillRef>
+          <a:effectRef idx="2">
+            <a:schemeClr val="accent2"/>
+          </a:effectRef>
+          <a:fontRef idx="minor">
+            <a:schemeClr val="tx1"/>
+          </a:fontRef>
+        </p:style>
+      </p:cxnSp>
+      <p:cxnSp>
+        <p:nvCxnSpPr>
+          <p:cNvPr id="28" name="Straight Arrow Connector 27">
+            <a:extLst>
+              <a:ext uri="{FF2B5EF4-FFF2-40B4-BE49-F238E27FC236}">
+                <a16:creationId xmlns:a16="http://schemas.microsoft.com/office/drawing/2014/main" id="{A8AE7D2F-262E-1845-892E-DC41D5066020}"/>
+              </a:ext>
+            </a:extLst>
+          </p:cNvPr>
+          <p:cNvCxnSpPr>
+            <a:cxnSpLocks/>
+          </p:cNvCxnSpPr>
+          <p:nvPr/>
+        </p:nvCxnSpPr>
+        <p:spPr>
+          <a:xfrm>
+            <a:off x="6742980" y="4601472"/>
+            <a:ext cx="649858" cy="799382"/>
+          </a:xfrm>
+          <a:prstGeom prst="straightConnector1">
+            <a:avLst/>
+          </a:prstGeom>
+          <a:ln w="57150">
+            <a:tailEnd type="triangle"/>
+          </a:ln>
+        </p:spPr>
+        <p:style>
+          <a:lnRef idx="3">
+            <a:schemeClr val="accent2"/>
+          </a:lnRef>
+          <a:fillRef idx="0">
+            <a:schemeClr val="accent2"/>
+          </a:fillRef>
+          <a:effectRef idx="2">
+            <a:schemeClr val="accent2"/>
+          </a:effectRef>
+          <a:fontRef idx="minor">
+            <a:schemeClr val="tx1"/>
+          </a:fontRef>
+        </p:style>
+      </p:cxnSp>
+      <p:sp>
+        <p:nvSpPr>
+          <p:cNvPr id="30" name="Oval 29">
+            <a:extLst>
+              <a:ext uri="{FF2B5EF4-FFF2-40B4-BE49-F238E27FC236}">
+                <a16:creationId xmlns:a16="http://schemas.microsoft.com/office/drawing/2014/main" id="{ED54879A-B4E0-EE44-962D-BD015919870B}"/>
+              </a:ext>
+            </a:extLst>
+          </p:cNvPr>
+          <p:cNvSpPr/>
+          <p:nvPr/>
+        </p:nvSpPr>
+        <p:spPr>
+          <a:xfrm>
+            <a:off x="-342181" y="3746902"/>
+            <a:ext cx="2035834" cy="715993"/>
+          </a:xfrm>
+          <a:prstGeom prst="ellipse">
+            <a:avLst/>
+          </a:prstGeom>
+          <a:solidFill>
+            <a:srgbClr val="00B0F0"/>
+          </a:solidFill>
+        </p:spPr>
+        <p:style>
+          <a:lnRef idx="2">
+            <a:schemeClr val="accent4">
+              <a:shade val="50000"/>
+            </a:schemeClr>
+          </a:lnRef>
+          <a:fillRef idx="1">
+            <a:schemeClr val="accent4"/>
+          </a:fillRef>
+          <a:effectRef idx="0">
+            <a:schemeClr val="accent4"/>
+          </a:effectRef>
+          <a:fontRef idx="minor">
+            <a:schemeClr val="lt1"/>
+          </a:fontRef>
+        </p:style>
+        <p:txBody>
+          <a:bodyPr rtlCol="0" anchor="ctr"/>
+          <a:lstStyle/>
+          <a:p>
+            <a:pPr algn="ctr"/>
+            <a:r>
+              <a:rPr lang="en-FR" dirty="0"/>
+              <a:t> AjouterPlat</a:t>
+            </a:r>
+          </a:p>
+        </p:txBody>
+      </p:sp>
+      <p:sp>
+        <p:nvSpPr>
+          <p:cNvPr id="31" name="Oval 30">
+            <a:extLst>
+              <a:ext uri="{FF2B5EF4-FFF2-40B4-BE49-F238E27FC236}">
+                <a16:creationId xmlns:a16="http://schemas.microsoft.com/office/drawing/2014/main" id="{7FE4F88D-582C-3D42-98DD-0E0FD2EB4512}"/>
+              </a:ext>
+            </a:extLst>
+          </p:cNvPr>
+          <p:cNvSpPr/>
+          <p:nvPr/>
+        </p:nvSpPr>
+        <p:spPr>
+          <a:xfrm>
+            <a:off x="-342181" y="4583993"/>
+            <a:ext cx="2035834" cy="715993"/>
+          </a:xfrm>
+          <a:prstGeom prst="ellipse">
+            <a:avLst/>
+          </a:prstGeom>
+          <a:solidFill>
+            <a:srgbClr val="00B0F0"/>
+          </a:solidFill>
+        </p:spPr>
+        <p:style>
+          <a:lnRef idx="2">
+            <a:schemeClr val="accent4">
+              <a:shade val="50000"/>
+            </a:schemeClr>
+          </a:lnRef>
+          <a:fillRef idx="1">
+            <a:schemeClr val="accent4"/>
+          </a:fillRef>
+          <a:effectRef idx="0">
+            <a:schemeClr val="accent4"/>
+          </a:effectRef>
+          <a:fontRef idx="minor">
+            <a:schemeClr val="lt1"/>
+          </a:fontRef>
+        </p:style>
+        <p:txBody>
+          <a:bodyPr rtlCol="0" anchor="ctr"/>
+          <a:lstStyle/>
+          <a:p>
+            <a:pPr algn="ctr"/>
+            <a:r>
+              <a:rPr lang="en-FR" dirty="0"/>
+              <a:t> ListerPlat</a:t>
+            </a:r>
+          </a:p>
+        </p:txBody>
+      </p:sp>
+      <p:cxnSp>
+        <p:nvCxnSpPr>
+          <p:cNvPr id="32" name="Straight Arrow Connector 31">
+            <a:extLst>
+              <a:ext uri="{FF2B5EF4-FFF2-40B4-BE49-F238E27FC236}">
+                <a16:creationId xmlns:a16="http://schemas.microsoft.com/office/drawing/2014/main" id="{311F0A25-681F-544B-AEFC-7478F3339C20}"/>
+              </a:ext>
+            </a:extLst>
+          </p:cNvPr>
+          <p:cNvCxnSpPr>
+            <a:cxnSpLocks/>
+          </p:cNvCxnSpPr>
+          <p:nvPr/>
+        </p:nvCxnSpPr>
+        <p:spPr>
+          <a:xfrm flipH="1">
+            <a:off x="808008" y="3265816"/>
+            <a:ext cx="1584384" cy="652371"/>
+          </a:xfrm>
+          <a:prstGeom prst="straightConnector1">
+            <a:avLst/>
+          </a:prstGeom>
+          <a:ln w="57150">
+            <a:tailEnd type="triangle"/>
+          </a:ln>
+        </p:spPr>
+        <p:style>
+          <a:lnRef idx="3">
+            <a:schemeClr val="accent2"/>
+          </a:lnRef>
+          <a:fillRef idx="0">
+            <a:schemeClr val="accent2"/>
+          </a:fillRef>
+          <a:effectRef idx="2">
+            <a:schemeClr val="accent2"/>
+          </a:effectRef>
+          <a:fontRef idx="minor">
+            <a:schemeClr val="tx1"/>
+          </a:fontRef>
+        </p:style>
+      </p:cxnSp>
+      <p:cxnSp>
+        <p:nvCxnSpPr>
+          <p:cNvPr id="34" name="Straight Arrow Connector 33">
+            <a:extLst>
+              <a:ext uri="{FF2B5EF4-FFF2-40B4-BE49-F238E27FC236}">
+                <a16:creationId xmlns:a16="http://schemas.microsoft.com/office/drawing/2014/main" id="{F2A23B0F-98B9-024D-806A-784A75E249E2}"/>
+              </a:ext>
+            </a:extLst>
+          </p:cNvPr>
+          <p:cNvCxnSpPr>
+            <a:cxnSpLocks/>
+          </p:cNvCxnSpPr>
+          <p:nvPr/>
+        </p:nvCxnSpPr>
+        <p:spPr>
+          <a:xfrm flipH="1">
+            <a:off x="675736" y="3418216"/>
+            <a:ext cx="1869056" cy="1451426"/>
+          </a:xfrm>
+          <a:prstGeom prst="straightConnector1">
+            <a:avLst/>
+          </a:prstGeom>
+          <a:ln w="57150">
+            <a:tailEnd type="triangle"/>
+          </a:ln>
+        </p:spPr>
+        <p:style>
+          <a:lnRef idx="3">
+            <a:schemeClr val="accent2"/>
+          </a:lnRef>
+          <a:fillRef idx="0">
+            <a:schemeClr val="accent2"/>
+          </a:fillRef>
+          <a:effectRef idx="2">
+            <a:schemeClr val="accent2"/>
+          </a:effectRef>
+          <a:fontRef idx="minor">
+            <a:schemeClr val="tx1"/>
+          </a:fontRef>
+        </p:style>
+      </p:cxnSp>
+      <p:cxnSp>
+        <p:nvCxnSpPr>
+          <p:cNvPr id="36" name="Straight Arrow Connector 35">
+            <a:extLst>
+              <a:ext uri="{FF2B5EF4-FFF2-40B4-BE49-F238E27FC236}">
+                <a16:creationId xmlns:a16="http://schemas.microsoft.com/office/drawing/2014/main" id="{733A24E2-86D5-0942-9FB3-04BC8D87ABB3}"/>
+              </a:ext>
+            </a:extLst>
+          </p:cNvPr>
+          <p:cNvCxnSpPr>
+            <a:cxnSpLocks/>
+            <a:endCxn id="23" idx="3"/>
+          </p:cNvCxnSpPr>
+          <p:nvPr/>
+        </p:nvCxnSpPr>
+        <p:spPr>
+          <a:xfrm flipV="1">
+            <a:off x="1304027" y="4707246"/>
+            <a:ext cx="3923013" cy="243010"/>
+          </a:xfrm>
+          <a:prstGeom prst="straightConnector1">
+            <a:avLst/>
+          </a:prstGeom>
+          <a:ln w="57150">
+            <a:tailEnd type="triangle"/>
+          </a:ln>
+        </p:spPr>
+        <p:style>
+          <a:lnRef idx="3">
+            <a:schemeClr val="accent2"/>
+          </a:lnRef>
+          <a:fillRef idx="0">
+            <a:schemeClr val="accent2"/>
+          </a:fillRef>
+          <a:effectRef idx="2">
+            <a:schemeClr val="accent2"/>
+          </a:effectRef>
+          <a:fontRef idx="minor">
+            <a:schemeClr val="tx1"/>
+          </a:fontRef>
+        </p:style>
+      </p:cxnSp>
+      <p:cxnSp>
+        <p:nvCxnSpPr>
+          <p:cNvPr id="38" name="Straight Arrow Connector 37">
+            <a:extLst>
+              <a:ext uri="{FF2B5EF4-FFF2-40B4-BE49-F238E27FC236}">
+                <a16:creationId xmlns:a16="http://schemas.microsoft.com/office/drawing/2014/main" id="{F0720660-5FDA-9D48-B7D0-3113FFB1E892}"/>
+              </a:ext>
+            </a:extLst>
+          </p:cNvPr>
+          <p:cNvCxnSpPr>
+            <a:cxnSpLocks/>
+          </p:cNvCxnSpPr>
+          <p:nvPr/>
+        </p:nvCxnSpPr>
+        <p:spPr>
+          <a:xfrm flipV="1">
+            <a:off x="3562709" y="2528666"/>
+            <a:ext cx="3830129" cy="623288"/>
+          </a:xfrm>
+          <a:prstGeom prst="straightConnector1">
+            <a:avLst/>
+          </a:prstGeom>
+          <a:ln w="57150">
+            <a:tailEnd type="triangle"/>
+          </a:ln>
+        </p:spPr>
+        <p:style>
+          <a:lnRef idx="3">
+            <a:schemeClr val="accent2"/>
+          </a:lnRef>
+          <a:fillRef idx="0">
+            <a:schemeClr val="accent2"/>
+          </a:fillRef>
+          <a:effectRef idx="2">
+            <a:schemeClr val="accent2"/>
+          </a:effectRef>
+          <a:fontRef idx="minor">
+            <a:schemeClr val="tx1"/>
+          </a:fontRef>
+        </p:style>
+      </p:cxnSp>
+    </p:spTree>
+    <p:extLst>
+      <p:ext uri="{BB962C8B-B14F-4D97-AF65-F5344CB8AC3E}">
+        <p14:creationId xmlns:p14="http://schemas.microsoft.com/office/powerpoint/2010/main" val="1145749731"/>
       </p:ext>
     </p:extLst>
   </p:cSld>

</xml_diff>

<commit_message>
Spring MVC - Démo
</commit_message>
<xml_diff>
--- a/schemas.pptx
+++ b/schemas.pptx
@@ -12,6 +12,8 @@
     <p:sldId id="260" r:id="rId6"/>
     <p:sldId id="261" r:id="rId7"/>
     <p:sldId id="262" r:id="rId8"/>
+    <p:sldId id="263" r:id="rId9"/>
+    <p:sldId id="264" r:id="rId10"/>
   </p:sldIdLst>
   <p:sldSz cx="12192000" cy="6858000"/>
   <p:notesSz cx="6858000" cy="9144000"/>
@@ -267,7 +269,7 @@
           <a:p>
             <a:fld id="{3B644675-409E-A14A-916B-0BAB1041637D}" type="datetimeFigureOut">
               <a:rPr lang="en-FR" smtClean="0"/>
-              <a:t>27/01/2022</a:t>
+              <a:t>31/01/2022</a:t>
             </a:fld>
             <a:endParaRPr lang="en-FR"/>
           </a:p>
@@ -467,7 +469,7 @@
           <a:p>
             <a:fld id="{3B644675-409E-A14A-916B-0BAB1041637D}" type="datetimeFigureOut">
               <a:rPr lang="en-FR" smtClean="0"/>
-              <a:t>27/01/2022</a:t>
+              <a:t>31/01/2022</a:t>
             </a:fld>
             <a:endParaRPr lang="en-FR"/>
           </a:p>
@@ -677,7 +679,7 @@
           <a:p>
             <a:fld id="{3B644675-409E-A14A-916B-0BAB1041637D}" type="datetimeFigureOut">
               <a:rPr lang="en-FR" smtClean="0"/>
-              <a:t>27/01/2022</a:t>
+              <a:t>31/01/2022</a:t>
             </a:fld>
             <a:endParaRPr lang="en-FR"/>
           </a:p>
@@ -877,7 +879,7 @@
           <a:p>
             <a:fld id="{3B644675-409E-A14A-916B-0BAB1041637D}" type="datetimeFigureOut">
               <a:rPr lang="en-FR" smtClean="0"/>
-              <a:t>27/01/2022</a:t>
+              <a:t>31/01/2022</a:t>
             </a:fld>
             <a:endParaRPr lang="en-FR"/>
           </a:p>
@@ -1153,7 +1155,7 @@
           <a:p>
             <a:fld id="{3B644675-409E-A14A-916B-0BAB1041637D}" type="datetimeFigureOut">
               <a:rPr lang="en-FR" smtClean="0"/>
-              <a:t>27/01/2022</a:t>
+              <a:t>31/01/2022</a:t>
             </a:fld>
             <a:endParaRPr lang="en-FR"/>
           </a:p>
@@ -1421,7 +1423,7 @@
           <a:p>
             <a:fld id="{3B644675-409E-A14A-916B-0BAB1041637D}" type="datetimeFigureOut">
               <a:rPr lang="en-FR" smtClean="0"/>
-              <a:t>27/01/2022</a:t>
+              <a:t>31/01/2022</a:t>
             </a:fld>
             <a:endParaRPr lang="en-FR"/>
           </a:p>
@@ -1836,7 +1838,7 @@
           <a:p>
             <a:fld id="{3B644675-409E-A14A-916B-0BAB1041637D}" type="datetimeFigureOut">
               <a:rPr lang="en-FR" smtClean="0"/>
-              <a:t>27/01/2022</a:t>
+              <a:t>31/01/2022</a:t>
             </a:fld>
             <a:endParaRPr lang="en-FR"/>
           </a:p>
@@ -1978,7 +1980,7 @@
           <a:p>
             <a:fld id="{3B644675-409E-A14A-916B-0BAB1041637D}" type="datetimeFigureOut">
               <a:rPr lang="en-FR" smtClean="0"/>
-              <a:t>27/01/2022</a:t>
+              <a:t>31/01/2022</a:t>
             </a:fld>
             <a:endParaRPr lang="en-FR"/>
           </a:p>
@@ -2091,7 +2093,7 @@
           <a:p>
             <a:fld id="{3B644675-409E-A14A-916B-0BAB1041637D}" type="datetimeFigureOut">
               <a:rPr lang="en-FR" smtClean="0"/>
-              <a:t>27/01/2022</a:t>
+              <a:t>31/01/2022</a:t>
             </a:fld>
             <a:endParaRPr lang="en-FR"/>
           </a:p>
@@ -2404,7 +2406,7 @@
           <a:p>
             <a:fld id="{3B644675-409E-A14A-916B-0BAB1041637D}" type="datetimeFigureOut">
               <a:rPr lang="en-FR" smtClean="0"/>
-              <a:t>27/01/2022</a:t>
+              <a:t>31/01/2022</a:t>
             </a:fld>
             <a:endParaRPr lang="en-FR"/>
           </a:p>
@@ -2693,7 +2695,7 @@
           <a:p>
             <a:fld id="{3B644675-409E-A14A-916B-0BAB1041637D}" type="datetimeFigureOut">
               <a:rPr lang="en-FR" smtClean="0"/>
-              <a:t>27/01/2022</a:t>
+              <a:t>31/01/2022</a:t>
             </a:fld>
             <a:endParaRPr lang="en-FR"/>
           </a:p>
@@ -2936,7 +2938,7 @@
           <a:p>
             <a:fld id="{3B644675-409E-A14A-916B-0BAB1041637D}" type="datetimeFigureOut">
               <a:rPr lang="en-FR" smtClean="0"/>
-              <a:t>27/01/2022</a:t>
+              <a:t>31/01/2022</a:t>
             </a:fld>
             <a:endParaRPr lang="en-FR"/>
           </a:p>
@@ -7831,6 +7833,1212 @@
 </p:sld>
 </file>
 
+<file path=ppt/slides/slide8.xml><?xml version="1.0" encoding="utf-8"?>
+<p:sld xmlns:a="http://schemas.openxmlformats.org/drawingml/2006/main" xmlns:r="http://schemas.openxmlformats.org/officeDocument/2006/relationships" xmlns:p="http://schemas.openxmlformats.org/presentationml/2006/main">
+  <p:cSld>
+    <p:spTree>
+      <p:nvGrpSpPr>
+        <p:cNvPr id="1" name=""/>
+        <p:cNvGrpSpPr/>
+        <p:nvPr/>
+      </p:nvGrpSpPr>
+      <p:grpSpPr>
+        <a:xfrm>
+          <a:off x="0" y="0"/>
+          <a:ext cx="0" cy="0"/>
+          <a:chOff x="0" y="0"/>
+          <a:chExt cx="0" cy="0"/>
+        </a:xfrm>
+      </p:grpSpPr>
+      <p:sp>
+        <p:nvSpPr>
+          <p:cNvPr id="2" name="Rounded Rectangle 1">
+            <a:extLst>
+              <a:ext uri="{FF2B5EF4-FFF2-40B4-BE49-F238E27FC236}">
+                <a16:creationId xmlns:a16="http://schemas.microsoft.com/office/drawing/2014/main" id="{DB9F9C39-2A19-3045-8E66-A342C34D1827}"/>
+              </a:ext>
+            </a:extLst>
+          </p:cNvPr>
+          <p:cNvSpPr/>
+          <p:nvPr/>
+        </p:nvSpPr>
+        <p:spPr>
+          <a:xfrm>
+            <a:off x="3623094" y="543464"/>
+            <a:ext cx="5253487" cy="5900468"/>
+          </a:xfrm>
+          <a:prstGeom prst="roundRect">
+            <a:avLst/>
+          </a:prstGeom>
+        </p:spPr>
+        <p:style>
+          <a:lnRef idx="2">
+            <a:schemeClr val="dk1"/>
+          </a:lnRef>
+          <a:fillRef idx="1">
+            <a:schemeClr val="lt1"/>
+          </a:fillRef>
+          <a:effectRef idx="0">
+            <a:schemeClr val="dk1"/>
+          </a:effectRef>
+          <a:fontRef idx="minor">
+            <a:schemeClr val="dk1"/>
+          </a:fontRef>
+        </p:style>
+        <p:txBody>
+          <a:bodyPr rtlCol="0" anchor="t"/>
+          <a:lstStyle/>
+          <a:p>
+            <a:pPr algn="ctr"/>
+            <a:r>
+              <a:rPr lang="en-FR" dirty="0"/>
+              <a:t>Application Demo Spring MVC</a:t>
+            </a:r>
+          </a:p>
+        </p:txBody>
+      </p:sp>
+      <p:sp>
+        <p:nvSpPr>
+          <p:cNvPr id="3" name="Right Arrow 2">
+            <a:extLst>
+              <a:ext uri="{FF2B5EF4-FFF2-40B4-BE49-F238E27FC236}">
+                <a16:creationId xmlns:a16="http://schemas.microsoft.com/office/drawing/2014/main" id="{2727473E-A16B-FA48-9152-CB49F007B562}"/>
+              </a:ext>
+            </a:extLst>
+          </p:cNvPr>
+          <p:cNvSpPr/>
+          <p:nvPr/>
+        </p:nvSpPr>
+        <p:spPr>
+          <a:xfrm>
+            <a:off x="1130060" y="2363638"/>
+            <a:ext cx="2932981" cy="362309"/>
+          </a:xfrm>
+          <a:prstGeom prst="rightArrow">
+            <a:avLst/>
+          </a:prstGeom>
+          <a:solidFill>
+            <a:schemeClr val="accent2"/>
+          </a:solidFill>
+        </p:spPr>
+        <p:style>
+          <a:lnRef idx="2">
+            <a:schemeClr val="accent1">
+              <a:shade val="50000"/>
+            </a:schemeClr>
+          </a:lnRef>
+          <a:fillRef idx="1">
+            <a:schemeClr val="accent1"/>
+          </a:fillRef>
+          <a:effectRef idx="0">
+            <a:schemeClr val="accent1"/>
+          </a:effectRef>
+          <a:fontRef idx="minor">
+            <a:schemeClr val="lt1"/>
+          </a:fontRef>
+        </p:style>
+        <p:txBody>
+          <a:bodyPr rtlCol="0" anchor="ctr"/>
+          <a:lstStyle/>
+          <a:p>
+            <a:pPr algn="ctr"/>
+            <a:endParaRPr lang="en-FR"/>
+          </a:p>
+        </p:txBody>
+      </p:sp>
+      <p:sp>
+        <p:nvSpPr>
+          <p:cNvPr id="4" name="TextBox 3">
+            <a:extLst>
+              <a:ext uri="{FF2B5EF4-FFF2-40B4-BE49-F238E27FC236}">
+                <a16:creationId xmlns:a16="http://schemas.microsoft.com/office/drawing/2014/main" id="{CBB2505A-9412-664D-A73C-79AA3C2BDCAD}"/>
+              </a:ext>
+            </a:extLst>
+          </p:cNvPr>
+          <p:cNvSpPr txBox="1"/>
+          <p:nvPr/>
+        </p:nvSpPr>
+        <p:spPr>
+          <a:xfrm>
+            <a:off x="864432" y="976389"/>
+            <a:ext cx="1860959" cy="1384995"/>
+          </a:xfrm>
+          <a:prstGeom prst="rect">
+            <a:avLst/>
+          </a:prstGeom>
+          <a:noFill/>
+        </p:spPr>
+        <p:txBody>
+          <a:bodyPr wrap="none" rtlCol="0">
+            <a:spAutoFit/>
+          </a:bodyPr>
+          <a:lstStyle/>
+          <a:p>
+            <a:r>
+              <a:rPr lang="en-FR" dirty="0"/>
+              <a:t>Requête HTTP</a:t>
+            </a:r>
+          </a:p>
+          <a:p>
+            <a:endParaRPr lang="en-FR" dirty="0"/>
+          </a:p>
+          <a:p>
+            <a:r>
+              <a:rPr lang="en-FR" sz="1200" i="1" dirty="0"/>
+              <a:t>METHODE URL &lt;VERSION&gt;</a:t>
+            </a:r>
+            <a:br>
+              <a:rPr lang="en-FR" sz="1200" i="1" dirty="0"/>
+            </a:br>
+            <a:r>
+              <a:rPr lang="en-FR" sz="1200" i="1" dirty="0"/>
+              <a:t>Entêtes</a:t>
+            </a:r>
+          </a:p>
+          <a:p>
+            <a:endParaRPr lang="en-FR" sz="1200" i="1" dirty="0"/>
+          </a:p>
+          <a:p>
+            <a:r>
+              <a:rPr lang="en-FR" sz="1200" i="1" dirty="0"/>
+              <a:t>CORPS</a:t>
+            </a:r>
+          </a:p>
+        </p:txBody>
+      </p:sp>
+      <p:sp>
+        <p:nvSpPr>
+          <p:cNvPr id="5" name="Right Arrow 4">
+            <a:extLst>
+              <a:ext uri="{FF2B5EF4-FFF2-40B4-BE49-F238E27FC236}">
+                <a16:creationId xmlns:a16="http://schemas.microsoft.com/office/drawing/2014/main" id="{3B33AEA6-6AD4-4C43-949F-D6408B913506}"/>
+              </a:ext>
+            </a:extLst>
+          </p:cNvPr>
+          <p:cNvSpPr/>
+          <p:nvPr/>
+        </p:nvSpPr>
+        <p:spPr>
+          <a:xfrm rot="10800000">
+            <a:off x="1130060" y="3299819"/>
+            <a:ext cx="2932981" cy="362309"/>
+          </a:xfrm>
+          <a:prstGeom prst="rightArrow">
+            <a:avLst/>
+          </a:prstGeom>
+          <a:solidFill>
+            <a:schemeClr val="accent2"/>
+          </a:solidFill>
+        </p:spPr>
+        <p:style>
+          <a:lnRef idx="2">
+            <a:schemeClr val="accent1">
+              <a:shade val="50000"/>
+            </a:schemeClr>
+          </a:lnRef>
+          <a:fillRef idx="1">
+            <a:schemeClr val="accent1"/>
+          </a:fillRef>
+          <a:effectRef idx="0">
+            <a:schemeClr val="accent1"/>
+          </a:effectRef>
+          <a:fontRef idx="minor">
+            <a:schemeClr val="lt1"/>
+          </a:fontRef>
+        </p:style>
+        <p:txBody>
+          <a:bodyPr rtlCol="0" anchor="ctr"/>
+          <a:lstStyle/>
+          <a:p>
+            <a:pPr algn="ctr"/>
+            <a:endParaRPr lang="en-FR"/>
+          </a:p>
+        </p:txBody>
+      </p:sp>
+      <p:sp>
+        <p:nvSpPr>
+          <p:cNvPr id="7" name="TextBox 6">
+            <a:extLst>
+              <a:ext uri="{FF2B5EF4-FFF2-40B4-BE49-F238E27FC236}">
+                <a16:creationId xmlns:a16="http://schemas.microsoft.com/office/drawing/2014/main" id="{3473A13D-0772-034A-B024-F3A4E39E85F4}"/>
+              </a:ext>
+            </a:extLst>
+          </p:cNvPr>
+          <p:cNvSpPr txBox="1"/>
+          <p:nvPr/>
+        </p:nvSpPr>
+        <p:spPr>
+          <a:xfrm>
+            <a:off x="930921" y="3804119"/>
+            <a:ext cx="1910908" cy="1384995"/>
+          </a:xfrm>
+          <a:prstGeom prst="rect">
+            <a:avLst/>
+          </a:prstGeom>
+          <a:noFill/>
+        </p:spPr>
+        <p:txBody>
+          <a:bodyPr wrap="none" rtlCol="0">
+            <a:spAutoFit/>
+          </a:bodyPr>
+          <a:lstStyle/>
+          <a:p>
+            <a:r>
+              <a:rPr lang="en-FR" dirty="0"/>
+              <a:t>Réponses HTTP</a:t>
+            </a:r>
+          </a:p>
+          <a:p>
+            <a:endParaRPr lang="en-FR" dirty="0"/>
+          </a:p>
+          <a:p>
+            <a:r>
+              <a:rPr lang="en-FR" sz="1200" i="1" dirty="0"/>
+              <a:t>STATUT – LIBELLE &lt;Version&gt;</a:t>
+            </a:r>
+          </a:p>
+          <a:p>
+            <a:r>
+              <a:rPr lang="en-FR" sz="1200" i="1" dirty="0"/>
+              <a:t>Entêtes </a:t>
+            </a:r>
+          </a:p>
+          <a:p>
+            <a:endParaRPr lang="en-FR" sz="1200" i="1" dirty="0"/>
+          </a:p>
+          <a:p>
+            <a:r>
+              <a:rPr lang="en-FR" sz="1200" i="1" dirty="0"/>
+              <a:t>CORPS</a:t>
+            </a:r>
+          </a:p>
+        </p:txBody>
+      </p:sp>
+      <p:sp>
+        <p:nvSpPr>
+          <p:cNvPr id="8" name="TextBox 7">
+            <a:extLst>
+              <a:ext uri="{FF2B5EF4-FFF2-40B4-BE49-F238E27FC236}">
+                <a16:creationId xmlns:a16="http://schemas.microsoft.com/office/drawing/2014/main" id="{C8B7F437-41E7-2B4A-BC7B-939A3B267250}"/>
+              </a:ext>
+            </a:extLst>
+          </p:cNvPr>
+          <p:cNvSpPr txBox="1"/>
+          <p:nvPr/>
+        </p:nvSpPr>
+        <p:spPr>
+          <a:xfrm>
+            <a:off x="-25177" y="6013045"/>
+            <a:ext cx="2727029" cy="861774"/>
+          </a:xfrm>
+          <a:prstGeom prst="rect">
+            <a:avLst/>
+          </a:prstGeom>
+          <a:noFill/>
+        </p:spPr>
+        <p:txBody>
+          <a:bodyPr wrap="none" rtlCol="0">
+            <a:spAutoFit/>
+          </a:bodyPr>
+          <a:lstStyle/>
+          <a:p>
+            <a:r>
+              <a:rPr lang="en-FR" sz="1000" i="1" dirty="0"/>
+              <a:t>100-199 - Information </a:t>
+            </a:r>
+          </a:p>
+          <a:p>
+            <a:r>
+              <a:rPr lang="en-FR" sz="1000" i="1" dirty="0"/>
+              <a:t>200-299 - Succès</a:t>
+            </a:r>
+          </a:p>
+          <a:p>
+            <a:r>
+              <a:rPr lang="en-FR" sz="1000" i="1" dirty="0"/>
+              <a:t>300-399 - Redirection</a:t>
+            </a:r>
+          </a:p>
+          <a:p>
+            <a:r>
+              <a:rPr lang="en-FR" sz="1000" i="1" dirty="0"/>
+              <a:t>400-499 – Erreurs clients (dans la requête HTTP)</a:t>
+            </a:r>
+          </a:p>
+          <a:p>
+            <a:r>
+              <a:rPr lang="en-FR" sz="1000" i="1" dirty="0"/>
+              <a:t>500-599 – Erreurs serveurs (requête est OK)</a:t>
+            </a:r>
+          </a:p>
+        </p:txBody>
+      </p:sp>
+      <p:sp>
+        <p:nvSpPr>
+          <p:cNvPr id="9" name="Rectangle 8">
+            <a:extLst>
+              <a:ext uri="{FF2B5EF4-FFF2-40B4-BE49-F238E27FC236}">
+                <a16:creationId xmlns:a16="http://schemas.microsoft.com/office/drawing/2014/main" id="{EEE04ECB-FD06-E14A-A57D-883380C6C6CB}"/>
+              </a:ext>
+            </a:extLst>
+          </p:cNvPr>
+          <p:cNvSpPr/>
+          <p:nvPr/>
+        </p:nvSpPr>
+        <p:spPr>
+          <a:xfrm>
+            <a:off x="4140679" y="2208362"/>
+            <a:ext cx="1078302" cy="1595757"/>
+          </a:xfrm>
+          <a:prstGeom prst="rect">
+            <a:avLst/>
+          </a:prstGeom>
+        </p:spPr>
+        <p:style>
+          <a:lnRef idx="2">
+            <a:schemeClr val="accent1">
+              <a:shade val="50000"/>
+            </a:schemeClr>
+          </a:lnRef>
+          <a:fillRef idx="1">
+            <a:schemeClr val="accent1"/>
+          </a:fillRef>
+          <a:effectRef idx="0">
+            <a:schemeClr val="accent1"/>
+          </a:effectRef>
+          <a:fontRef idx="minor">
+            <a:schemeClr val="lt1"/>
+          </a:fontRef>
+        </p:style>
+        <p:txBody>
+          <a:bodyPr rtlCol="0" anchor="t"/>
+          <a:lstStyle/>
+          <a:p>
+            <a:pPr algn="ctr"/>
+            <a:r>
+              <a:rPr lang="en-FR" sz="1200" dirty="0"/>
+              <a:t>DispatcherServlet Spring</a:t>
+            </a:r>
+          </a:p>
+        </p:txBody>
+      </p:sp>
+      <p:sp>
+        <p:nvSpPr>
+          <p:cNvPr id="10" name="Rectangle 9">
+            <a:extLst>
+              <a:ext uri="{FF2B5EF4-FFF2-40B4-BE49-F238E27FC236}">
+                <a16:creationId xmlns:a16="http://schemas.microsoft.com/office/drawing/2014/main" id="{8BAD1C86-81F2-5B44-9E5E-EC7E61AE2360}"/>
+              </a:ext>
+            </a:extLst>
+          </p:cNvPr>
+          <p:cNvSpPr/>
+          <p:nvPr/>
+        </p:nvSpPr>
+        <p:spPr>
+          <a:xfrm>
+            <a:off x="5849259" y="1458413"/>
+            <a:ext cx="1613139" cy="508959"/>
+          </a:xfrm>
+          <a:prstGeom prst="rect">
+            <a:avLst/>
+          </a:prstGeom>
+        </p:spPr>
+        <p:style>
+          <a:lnRef idx="2">
+            <a:schemeClr val="accent1">
+              <a:shade val="50000"/>
+            </a:schemeClr>
+          </a:lnRef>
+          <a:fillRef idx="1">
+            <a:schemeClr val="accent1"/>
+          </a:fillRef>
+          <a:effectRef idx="0">
+            <a:schemeClr val="accent1"/>
+          </a:effectRef>
+          <a:fontRef idx="minor">
+            <a:schemeClr val="lt1"/>
+          </a:fontRef>
+        </p:style>
+        <p:txBody>
+          <a:bodyPr rtlCol="0" anchor="ctr"/>
+          <a:lstStyle/>
+          <a:p>
+            <a:pPr algn="ctr"/>
+            <a:r>
+              <a:rPr lang="en-FR" dirty="0"/>
+              <a:t>PlatCtrl</a:t>
+            </a:r>
+          </a:p>
+        </p:txBody>
+      </p:sp>
+      <p:cxnSp>
+        <p:nvCxnSpPr>
+          <p:cNvPr id="12" name="Straight Arrow Connector 11">
+            <a:extLst>
+              <a:ext uri="{FF2B5EF4-FFF2-40B4-BE49-F238E27FC236}">
+                <a16:creationId xmlns:a16="http://schemas.microsoft.com/office/drawing/2014/main" id="{BF70E3D0-67AD-9448-BD53-A541A6E59EEE}"/>
+              </a:ext>
+            </a:extLst>
+          </p:cNvPr>
+          <p:cNvCxnSpPr/>
+          <p:nvPr/>
+        </p:nvCxnSpPr>
+        <p:spPr>
+          <a:xfrm flipV="1">
+            <a:off x="5322498" y="2113472"/>
+            <a:ext cx="629728" cy="517585"/>
+          </a:xfrm>
+          <a:prstGeom prst="straightConnector1">
+            <a:avLst/>
+          </a:prstGeom>
+          <a:ln>
+            <a:tailEnd type="triangle"/>
+          </a:ln>
+        </p:spPr>
+        <p:style>
+          <a:lnRef idx="1">
+            <a:schemeClr val="accent1"/>
+          </a:lnRef>
+          <a:fillRef idx="0">
+            <a:schemeClr val="accent1"/>
+          </a:fillRef>
+          <a:effectRef idx="0">
+            <a:schemeClr val="accent1"/>
+          </a:effectRef>
+          <a:fontRef idx="minor">
+            <a:schemeClr val="tx1"/>
+          </a:fontRef>
+        </p:style>
+      </p:cxnSp>
+      <p:sp>
+        <p:nvSpPr>
+          <p:cNvPr id="13" name="TextBox 12">
+            <a:extLst>
+              <a:ext uri="{FF2B5EF4-FFF2-40B4-BE49-F238E27FC236}">
+                <a16:creationId xmlns:a16="http://schemas.microsoft.com/office/drawing/2014/main" id="{8E0C8947-BCB3-7847-8BFC-77A89A55C8B4}"/>
+              </a:ext>
+            </a:extLst>
+          </p:cNvPr>
+          <p:cNvSpPr txBox="1"/>
+          <p:nvPr/>
+        </p:nvSpPr>
+        <p:spPr>
+          <a:xfrm>
+            <a:off x="5305328" y="2084385"/>
+            <a:ext cx="543931" cy="276999"/>
+          </a:xfrm>
+          <a:prstGeom prst="rect">
+            <a:avLst/>
+          </a:prstGeom>
+          <a:noFill/>
+        </p:spPr>
+        <p:txBody>
+          <a:bodyPr wrap="none" rtlCol="0">
+            <a:spAutoFit/>
+          </a:bodyPr>
+          <a:lstStyle/>
+          <a:p>
+            <a:r>
+              <a:rPr lang="en-FR" sz="1200" dirty="0"/>
+              <a:t>/plats</a:t>
+            </a:r>
+          </a:p>
+        </p:txBody>
+      </p:sp>
+      <p:sp>
+        <p:nvSpPr>
+          <p:cNvPr id="14" name="TextBox 13">
+            <a:extLst>
+              <a:ext uri="{FF2B5EF4-FFF2-40B4-BE49-F238E27FC236}">
+                <a16:creationId xmlns:a16="http://schemas.microsoft.com/office/drawing/2014/main" id="{D743FF2E-5E1A-DE4B-848E-3B4049C74294}"/>
+              </a:ext>
+            </a:extLst>
+          </p:cNvPr>
+          <p:cNvSpPr txBox="1"/>
+          <p:nvPr/>
+        </p:nvSpPr>
+        <p:spPr>
+          <a:xfrm>
+            <a:off x="5351754" y="3385130"/>
+            <a:ext cx="645369" cy="276999"/>
+          </a:xfrm>
+          <a:prstGeom prst="rect">
+            <a:avLst/>
+          </a:prstGeom>
+          <a:noFill/>
+        </p:spPr>
+        <p:txBody>
+          <a:bodyPr wrap="none" rtlCol="0">
+            <a:spAutoFit/>
+          </a:bodyPr>
+          <a:lstStyle/>
+          <a:p>
+            <a:r>
+              <a:rPr lang="en-FR" sz="1200" dirty="0"/>
+              <a:t>/clients</a:t>
+            </a:r>
+          </a:p>
+        </p:txBody>
+      </p:sp>
+      <p:sp>
+        <p:nvSpPr>
+          <p:cNvPr id="15" name="Rectangle 14">
+            <a:extLst>
+              <a:ext uri="{FF2B5EF4-FFF2-40B4-BE49-F238E27FC236}">
+                <a16:creationId xmlns:a16="http://schemas.microsoft.com/office/drawing/2014/main" id="{44B39556-89CE-4C4F-8A67-8654B1616CCB}"/>
+              </a:ext>
+            </a:extLst>
+          </p:cNvPr>
+          <p:cNvSpPr/>
+          <p:nvPr/>
+        </p:nvSpPr>
+        <p:spPr>
+          <a:xfrm>
+            <a:off x="5952226" y="3549639"/>
+            <a:ext cx="1759789" cy="508959"/>
+          </a:xfrm>
+          <a:prstGeom prst="rect">
+            <a:avLst/>
+          </a:prstGeom>
+        </p:spPr>
+        <p:style>
+          <a:lnRef idx="2">
+            <a:schemeClr val="accent1">
+              <a:shade val="50000"/>
+            </a:schemeClr>
+          </a:lnRef>
+          <a:fillRef idx="1">
+            <a:schemeClr val="accent1"/>
+          </a:fillRef>
+          <a:effectRef idx="0">
+            <a:schemeClr val="accent1"/>
+          </a:effectRef>
+          <a:fontRef idx="minor">
+            <a:schemeClr val="lt1"/>
+          </a:fontRef>
+        </p:style>
+        <p:txBody>
+          <a:bodyPr rtlCol="0" anchor="ctr"/>
+          <a:lstStyle/>
+          <a:p>
+            <a:pPr algn="ctr"/>
+            <a:r>
+              <a:rPr lang="en-FR" dirty="0"/>
+              <a:t>ClientCtrl</a:t>
+            </a:r>
+          </a:p>
+        </p:txBody>
+      </p:sp>
+      <p:cxnSp>
+        <p:nvCxnSpPr>
+          <p:cNvPr id="16" name="Straight Arrow Connector 15">
+            <a:extLst>
+              <a:ext uri="{FF2B5EF4-FFF2-40B4-BE49-F238E27FC236}">
+                <a16:creationId xmlns:a16="http://schemas.microsoft.com/office/drawing/2014/main" id="{9C8B308E-B0DB-0348-B4A4-03DC00BCDE14}"/>
+              </a:ext>
+            </a:extLst>
+          </p:cNvPr>
+          <p:cNvCxnSpPr>
+            <a:cxnSpLocks/>
+          </p:cNvCxnSpPr>
+          <p:nvPr/>
+        </p:nvCxnSpPr>
+        <p:spPr>
+          <a:xfrm>
+            <a:off x="5270739" y="3558611"/>
+            <a:ext cx="578520" cy="245507"/>
+          </a:xfrm>
+          <a:prstGeom prst="straightConnector1">
+            <a:avLst/>
+          </a:prstGeom>
+          <a:ln>
+            <a:tailEnd type="triangle"/>
+          </a:ln>
+        </p:spPr>
+        <p:style>
+          <a:lnRef idx="1">
+            <a:schemeClr val="accent1"/>
+          </a:lnRef>
+          <a:fillRef idx="0">
+            <a:schemeClr val="accent1"/>
+          </a:fillRef>
+          <a:effectRef idx="0">
+            <a:schemeClr val="accent1"/>
+          </a:effectRef>
+          <a:fontRef idx="minor">
+            <a:schemeClr val="tx1"/>
+          </a:fontRef>
+        </p:style>
+      </p:cxnSp>
+      <p:sp>
+        <p:nvSpPr>
+          <p:cNvPr id="18" name="Rectangle 17">
+            <a:extLst>
+              <a:ext uri="{FF2B5EF4-FFF2-40B4-BE49-F238E27FC236}">
+                <a16:creationId xmlns:a16="http://schemas.microsoft.com/office/drawing/2014/main" id="{D1CF8A8D-B700-3349-810A-E5A9C5C6C21C}"/>
+              </a:ext>
+            </a:extLst>
+          </p:cNvPr>
+          <p:cNvSpPr/>
+          <p:nvPr/>
+        </p:nvSpPr>
+        <p:spPr>
+          <a:xfrm>
+            <a:off x="6168435" y="1215515"/>
+            <a:ext cx="1992154" cy="329115"/>
+          </a:xfrm>
+          <a:prstGeom prst="rect">
+            <a:avLst/>
+          </a:prstGeom>
+        </p:spPr>
+        <p:style>
+          <a:lnRef idx="2">
+            <a:schemeClr val="accent2">
+              <a:shade val="50000"/>
+            </a:schemeClr>
+          </a:lnRef>
+          <a:fillRef idx="1">
+            <a:schemeClr val="accent2"/>
+          </a:fillRef>
+          <a:effectRef idx="0">
+            <a:schemeClr val="accent2"/>
+          </a:effectRef>
+          <a:fontRef idx="minor">
+            <a:schemeClr val="lt1"/>
+          </a:fontRef>
+        </p:style>
+        <p:txBody>
+          <a:bodyPr rtlCol="0" anchor="ctr"/>
+          <a:lstStyle/>
+          <a:p>
+            <a:pPr algn="ctr"/>
+            <a:r>
+              <a:rPr lang="en-FR" sz="1200" dirty="0"/>
+              <a:t>@Controller</a:t>
+            </a:r>
+          </a:p>
+          <a:p>
+            <a:pPr algn="ctr"/>
+            <a:r>
+              <a:rPr lang="en-FR" sz="1200" dirty="0"/>
+              <a:t>@RequestMapping(“/plats”)</a:t>
+            </a:r>
+          </a:p>
+        </p:txBody>
+      </p:sp>
+      <p:sp>
+        <p:nvSpPr>
+          <p:cNvPr id="20" name="Rectangle 19">
+            <a:extLst>
+              <a:ext uri="{FF2B5EF4-FFF2-40B4-BE49-F238E27FC236}">
+                <a16:creationId xmlns:a16="http://schemas.microsoft.com/office/drawing/2014/main" id="{F5EE9ED4-8079-AC42-A070-3BA01AD6B764}"/>
+              </a:ext>
+            </a:extLst>
+          </p:cNvPr>
+          <p:cNvSpPr/>
+          <p:nvPr/>
+        </p:nvSpPr>
+        <p:spPr>
+          <a:xfrm>
+            <a:off x="6194879" y="3359071"/>
+            <a:ext cx="1992154" cy="329115"/>
+          </a:xfrm>
+          <a:prstGeom prst="rect">
+            <a:avLst/>
+          </a:prstGeom>
+        </p:spPr>
+        <p:style>
+          <a:lnRef idx="2">
+            <a:schemeClr val="accent2">
+              <a:shade val="50000"/>
+            </a:schemeClr>
+          </a:lnRef>
+          <a:fillRef idx="1">
+            <a:schemeClr val="accent2"/>
+          </a:fillRef>
+          <a:effectRef idx="0">
+            <a:schemeClr val="accent2"/>
+          </a:effectRef>
+          <a:fontRef idx="minor">
+            <a:schemeClr val="lt1"/>
+          </a:fontRef>
+        </p:style>
+        <p:txBody>
+          <a:bodyPr rtlCol="0" anchor="ctr"/>
+          <a:lstStyle/>
+          <a:p>
+            <a:pPr algn="ctr"/>
+            <a:r>
+              <a:rPr lang="en-FR" sz="1200" dirty="0"/>
+              <a:t>@Controller</a:t>
+            </a:r>
+          </a:p>
+          <a:p>
+            <a:pPr algn="ctr"/>
+            <a:r>
+              <a:rPr lang="en-FR" sz="1200" dirty="0"/>
+              <a:t>@RequestMapping(“/client”)</a:t>
+            </a:r>
+          </a:p>
+        </p:txBody>
+      </p:sp>
+    </p:spTree>
+    <p:extLst>
+      <p:ext uri="{BB962C8B-B14F-4D97-AF65-F5344CB8AC3E}">
+        <p14:creationId xmlns:p14="http://schemas.microsoft.com/office/powerpoint/2010/main" val="420326966"/>
+      </p:ext>
+    </p:extLst>
+  </p:cSld>
+  <p:clrMapOvr>
+    <a:masterClrMapping/>
+  </p:clrMapOvr>
+</p:sld>
+</file>
+
+<file path=ppt/slides/slide9.xml><?xml version="1.0" encoding="utf-8"?>
+<p:sld xmlns:a="http://schemas.openxmlformats.org/drawingml/2006/main" xmlns:r="http://schemas.openxmlformats.org/officeDocument/2006/relationships" xmlns:p="http://schemas.openxmlformats.org/presentationml/2006/main">
+  <p:cSld>
+    <p:spTree>
+      <p:nvGrpSpPr>
+        <p:cNvPr id="1" name=""/>
+        <p:cNvGrpSpPr/>
+        <p:nvPr/>
+      </p:nvGrpSpPr>
+      <p:grpSpPr>
+        <a:xfrm>
+          <a:off x="0" y="0"/>
+          <a:ext cx="0" cy="0"/>
+          <a:chOff x="0" y="0"/>
+          <a:chExt cx="0" cy="0"/>
+        </a:xfrm>
+      </p:grpSpPr>
+      <p:sp>
+        <p:nvSpPr>
+          <p:cNvPr id="2" name="Rounded Rectangle 1">
+            <a:extLst>
+              <a:ext uri="{FF2B5EF4-FFF2-40B4-BE49-F238E27FC236}">
+                <a16:creationId xmlns:a16="http://schemas.microsoft.com/office/drawing/2014/main" id="{DB9F9C39-2A19-3045-8E66-A342C34D1827}"/>
+              </a:ext>
+            </a:extLst>
+          </p:cNvPr>
+          <p:cNvSpPr/>
+          <p:nvPr/>
+        </p:nvSpPr>
+        <p:spPr>
+          <a:xfrm>
+            <a:off x="3623094" y="543464"/>
+            <a:ext cx="5253487" cy="5900468"/>
+          </a:xfrm>
+          <a:prstGeom prst="roundRect">
+            <a:avLst/>
+          </a:prstGeom>
+        </p:spPr>
+        <p:style>
+          <a:lnRef idx="2">
+            <a:schemeClr val="dk1"/>
+          </a:lnRef>
+          <a:fillRef idx="1">
+            <a:schemeClr val="lt1"/>
+          </a:fillRef>
+          <a:effectRef idx="0">
+            <a:schemeClr val="dk1"/>
+          </a:effectRef>
+          <a:fontRef idx="minor">
+            <a:schemeClr val="dk1"/>
+          </a:fontRef>
+        </p:style>
+        <p:txBody>
+          <a:bodyPr rtlCol="0" anchor="t"/>
+          <a:lstStyle/>
+          <a:p>
+            <a:pPr algn="ctr"/>
+            <a:r>
+              <a:rPr lang="en-FR" dirty="0"/>
+              <a:t>Application Demo Spring MVC</a:t>
+            </a:r>
+          </a:p>
+        </p:txBody>
+      </p:sp>
+      <p:sp>
+        <p:nvSpPr>
+          <p:cNvPr id="3" name="Right Arrow 2">
+            <a:extLst>
+              <a:ext uri="{FF2B5EF4-FFF2-40B4-BE49-F238E27FC236}">
+                <a16:creationId xmlns:a16="http://schemas.microsoft.com/office/drawing/2014/main" id="{2727473E-A16B-FA48-9152-CB49F007B562}"/>
+              </a:ext>
+            </a:extLst>
+          </p:cNvPr>
+          <p:cNvSpPr/>
+          <p:nvPr/>
+        </p:nvSpPr>
+        <p:spPr>
+          <a:xfrm>
+            <a:off x="1130060" y="2363638"/>
+            <a:ext cx="2932981" cy="362309"/>
+          </a:xfrm>
+          <a:prstGeom prst="rightArrow">
+            <a:avLst/>
+          </a:prstGeom>
+          <a:solidFill>
+            <a:schemeClr val="accent2"/>
+          </a:solidFill>
+        </p:spPr>
+        <p:style>
+          <a:lnRef idx="2">
+            <a:schemeClr val="accent1">
+              <a:shade val="50000"/>
+            </a:schemeClr>
+          </a:lnRef>
+          <a:fillRef idx="1">
+            <a:schemeClr val="accent1"/>
+          </a:fillRef>
+          <a:effectRef idx="0">
+            <a:schemeClr val="accent1"/>
+          </a:effectRef>
+          <a:fontRef idx="minor">
+            <a:schemeClr val="lt1"/>
+          </a:fontRef>
+        </p:style>
+        <p:txBody>
+          <a:bodyPr rtlCol="0" anchor="ctr"/>
+          <a:lstStyle/>
+          <a:p>
+            <a:pPr algn="ctr"/>
+            <a:endParaRPr lang="en-FR"/>
+          </a:p>
+        </p:txBody>
+      </p:sp>
+      <p:sp>
+        <p:nvSpPr>
+          <p:cNvPr id="4" name="TextBox 3">
+            <a:extLst>
+              <a:ext uri="{FF2B5EF4-FFF2-40B4-BE49-F238E27FC236}">
+                <a16:creationId xmlns:a16="http://schemas.microsoft.com/office/drawing/2014/main" id="{CBB2505A-9412-664D-A73C-79AA3C2BDCAD}"/>
+              </a:ext>
+            </a:extLst>
+          </p:cNvPr>
+          <p:cNvSpPr txBox="1"/>
+          <p:nvPr/>
+        </p:nvSpPr>
+        <p:spPr>
+          <a:xfrm>
+            <a:off x="1267138" y="1641358"/>
+            <a:ext cx="2278188" cy="830997"/>
+          </a:xfrm>
+          <a:prstGeom prst="rect">
+            <a:avLst/>
+          </a:prstGeom>
+          <a:noFill/>
+        </p:spPr>
+        <p:txBody>
+          <a:bodyPr wrap="none" rtlCol="0">
+            <a:spAutoFit/>
+          </a:bodyPr>
+          <a:lstStyle/>
+          <a:p>
+            <a:r>
+              <a:rPr lang="en-FR" dirty="0"/>
+              <a:t>Requête HTTP</a:t>
+            </a:r>
+          </a:p>
+          <a:p>
+            <a:endParaRPr lang="en-FR" dirty="0"/>
+          </a:p>
+          <a:p>
+            <a:r>
+              <a:rPr lang="en-FR" sz="1200" i="1" dirty="0"/>
+              <a:t>URL?</a:t>
+            </a:r>
+            <a:r>
+              <a:rPr lang="en-FR" sz="1200" b="1" i="1" dirty="0"/>
+              <a:t>param1=XXX&amp;param2=XXX</a:t>
+            </a:r>
+          </a:p>
+        </p:txBody>
+      </p:sp>
+      <p:sp>
+        <p:nvSpPr>
+          <p:cNvPr id="5" name="Right Arrow 4">
+            <a:extLst>
+              <a:ext uri="{FF2B5EF4-FFF2-40B4-BE49-F238E27FC236}">
+                <a16:creationId xmlns:a16="http://schemas.microsoft.com/office/drawing/2014/main" id="{3B33AEA6-6AD4-4C43-949F-D6408B913506}"/>
+              </a:ext>
+            </a:extLst>
+          </p:cNvPr>
+          <p:cNvSpPr/>
+          <p:nvPr/>
+        </p:nvSpPr>
+        <p:spPr>
+          <a:xfrm rot="10800000">
+            <a:off x="1130060" y="3299819"/>
+            <a:ext cx="2932981" cy="362309"/>
+          </a:xfrm>
+          <a:prstGeom prst="rightArrow">
+            <a:avLst/>
+          </a:prstGeom>
+          <a:solidFill>
+            <a:schemeClr val="accent2"/>
+          </a:solidFill>
+        </p:spPr>
+        <p:style>
+          <a:lnRef idx="2">
+            <a:schemeClr val="accent1">
+              <a:shade val="50000"/>
+            </a:schemeClr>
+          </a:lnRef>
+          <a:fillRef idx="1">
+            <a:schemeClr val="accent1"/>
+          </a:fillRef>
+          <a:effectRef idx="0">
+            <a:schemeClr val="accent1"/>
+          </a:effectRef>
+          <a:fontRef idx="minor">
+            <a:schemeClr val="lt1"/>
+          </a:fontRef>
+        </p:style>
+        <p:txBody>
+          <a:bodyPr rtlCol="0" anchor="ctr"/>
+          <a:lstStyle/>
+          <a:p>
+            <a:pPr algn="ctr"/>
+            <a:endParaRPr lang="en-FR"/>
+          </a:p>
+        </p:txBody>
+      </p:sp>
+      <p:sp>
+        <p:nvSpPr>
+          <p:cNvPr id="9" name="Rectangle 8">
+            <a:extLst>
+              <a:ext uri="{FF2B5EF4-FFF2-40B4-BE49-F238E27FC236}">
+                <a16:creationId xmlns:a16="http://schemas.microsoft.com/office/drawing/2014/main" id="{EEE04ECB-FD06-E14A-A57D-883380C6C6CB}"/>
+              </a:ext>
+            </a:extLst>
+          </p:cNvPr>
+          <p:cNvSpPr/>
+          <p:nvPr/>
+        </p:nvSpPr>
+        <p:spPr>
+          <a:xfrm>
+            <a:off x="4140679" y="2208362"/>
+            <a:ext cx="1078302" cy="1595757"/>
+          </a:xfrm>
+          <a:prstGeom prst="rect">
+            <a:avLst/>
+          </a:prstGeom>
+        </p:spPr>
+        <p:style>
+          <a:lnRef idx="2">
+            <a:schemeClr val="accent1">
+              <a:shade val="50000"/>
+            </a:schemeClr>
+          </a:lnRef>
+          <a:fillRef idx="1">
+            <a:schemeClr val="accent1"/>
+          </a:fillRef>
+          <a:effectRef idx="0">
+            <a:schemeClr val="accent1"/>
+          </a:effectRef>
+          <a:fontRef idx="minor">
+            <a:schemeClr val="lt1"/>
+          </a:fontRef>
+        </p:style>
+        <p:txBody>
+          <a:bodyPr rtlCol="0" anchor="t"/>
+          <a:lstStyle/>
+          <a:p>
+            <a:pPr algn="ctr"/>
+            <a:r>
+              <a:rPr lang="en-FR" sz="1200" dirty="0"/>
+              <a:t>DispatcherServlet Spring</a:t>
+            </a:r>
+          </a:p>
+        </p:txBody>
+      </p:sp>
+      <p:sp>
+        <p:nvSpPr>
+          <p:cNvPr id="10" name="Rectangle 9">
+            <a:extLst>
+              <a:ext uri="{FF2B5EF4-FFF2-40B4-BE49-F238E27FC236}">
+                <a16:creationId xmlns:a16="http://schemas.microsoft.com/office/drawing/2014/main" id="{8BAD1C86-81F2-5B44-9E5E-EC7E61AE2360}"/>
+              </a:ext>
+            </a:extLst>
+          </p:cNvPr>
+          <p:cNvSpPr/>
+          <p:nvPr/>
+        </p:nvSpPr>
+        <p:spPr>
+          <a:xfrm>
+            <a:off x="5849259" y="1458413"/>
+            <a:ext cx="1613139" cy="508959"/>
+          </a:xfrm>
+          <a:prstGeom prst="rect">
+            <a:avLst/>
+          </a:prstGeom>
+        </p:spPr>
+        <p:style>
+          <a:lnRef idx="2">
+            <a:schemeClr val="accent1">
+              <a:shade val="50000"/>
+            </a:schemeClr>
+          </a:lnRef>
+          <a:fillRef idx="1">
+            <a:schemeClr val="accent1"/>
+          </a:fillRef>
+          <a:effectRef idx="0">
+            <a:schemeClr val="accent1"/>
+          </a:effectRef>
+          <a:fontRef idx="minor">
+            <a:schemeClr val="lt1"/>
+          </a:fontRef>
+        </p:style>
+        <p:txBody>
+          <a:bodyPr rtlCol="0" anchor="ctr"/>
+          <a:lstStyle/>
+          <a:p>
+            <a:pPr algn="ctr"/>
+            <a:r>
+              <a:rPr lang="en-FR" dirty="0"/>
+              <a:t>PlatCtrl</a:t>
+            </a:r>
+          </a:p>
+        </p:txBody>
+      </p:sp>
+      <p:cxnSp>
+        <p:nvCxnSpPr>
+          <p:cNvPr id="12" name="Straight Arrow Connector 11">
+            <a:extLst>
+              <a:ext uri="{FF2B5EF4-FFF2-40B4-BE49-F238E27FC236}">
+                <a16:creationId xmlns:a16="http://schemas.microsoft.com/office/drawing/2014/main" id="{BF70E3D0-67AD-9448-BD53-A541A6E59EEE}"/>
+              </a:ext>
+            </a:extLst>
+          </p:cNvPr>
+          <p:cNvCxnSpPr/>
+          <p:nvPr/>
+        </p:nvCxnSpPr>
+        <p:spPr>
+          <a:xfrm flipV="1">
+            <a:off x="5322498" y="2113472"/>
+            <a:ext cx="629728" cy="517585"/>
+          </a:xfrm>
+          <a:prstGeom prst="straightConnector1">
+            <a:avLst/>
+          </a:prstGeom>
+          <a:ln>
+            <a:tailEnd type="triangle"/>
+          </a:ln>
+        </p:spPr>
+        <p:style>
+          <a:lnRef idx="1">
+            <a:schemeClr val="accent1"/>
+          </a:lnRef>
+          <a:fillRef idx="0">
+            <a:schemeClr val="accent1"/>
+          </a:fillRef>
+          <a:effectRef idx="0">
+            <a:schemeClr val="accent1"/>
+          </a:effectRef>
+          <a:fontRef idx="minor">
+            <a:schemeClr val="tx1"/>
+          </a:fontRef>
+        </p:style>
+      </p:cxnSp>
+      <p:sp>
+        <p:nvSpPr>
+          <p:cNvPr id="13" name="TextBox 12">
+            <a:extLst>
+              <a:ext uri="{FF2B5EF4-FFF2-40B4-BE49-F238E27FC236}">
+                <a16:creationId xmlns:a16="http://schemas.microsoft.com/office/drawing/2014/main" id="{8E0C8947-BCB3-7847-8BFC-77A89A55C8B4}"/>
+              </a:ext>
+            </a:extLst>
+          </p:cNvPr>
+          <p:cNvSpPr txBox="1"/>
+          <p:nvPr/>
+        </p:nvSpPr>
+        <p:spPr>
+          <a:xfrm>
+            <a:off x="5305328" y="2084385"/>
+            <a:ext cx="543931" cy="276999"/>
+          </a:xfrm>
+          <a:prstGeom prst="rect">
+            <a:avLst/>
+          </a:prstGeom>
+          <a:noFill/>
+        </p:spPr>
+        <p:txBody>
+          <a:bodyPr wrap="none" rtlCol="0">
+            <a:spAutoFit/>
+          </a:bodyPr>
+          <a:lstStyle/>
+          <a:p>
+            <a:r>
+              <a:rPr lang="en-FR" sz="1200" dirty="0"/>
+              <a:t>/plats</a:t>
+            </a:r>
+          </a:p>
+        </p:txBody>
+      </p:sp>
+      <p:sp>
+        <p:nvSpPr>
+          <p:cNvPr id="18" name="Rectangle 17">
+            <a:extLst>
+              <a:ext uri="{FF2B5EF4-FFF2-40B4-BE49-F238E27FC236}">
+                <a16:creationId xmlns:a16="http://schemas.microsoft.com/office/drawing/2014/main" id="{D1CF8A8D-B700-3349-810A-E5A9C5C6C21C}"/>
+              </a:ext>
+            </a:extLst>
+          </p:cNvPr>
+          <p:cNvSpPr/>
+          <p:nvPr/>
+        </p:nvSpPr>
+        <p:spPr>
+          <a:xfrm>
+            <a:off x="6315359" y="1861321"/>
+            <a:ext cx="1992154" cy="329115"/>
+          </a:xfrm>
+          <a:prstGeom prst="rect">
+            <a:avLst/>
+          </a:prstGeom>
+        </p:spPr>
+        <p:style>
+          <a:lnRef idx="2">
+            <a:schemeClr val="accent2">
+              <a:shade val="50000"/>
+            </a:schemeClr>
+          </a:lnRef>
+          <a:fillRef idx="1">
+            <a:schemeClr val="accent2"/>
+          </a:fillRef>
+          <a:effectRef idx="0">
+            <a:schemeClr val="accent2"/>
+          </a:effectRef>
+          <a:fontRef idx="minor">
+            <a:schemeClr val="lt1"/>
+          </a:fontRef>
+        </p:style>
+        <p:txBody>
+          <a:bodyPr rtlCol="0" anchor="ctr"/>
+          <a:lstStyle/>
+          <a:p>
+            <a:pPr algn="ctr"/>
+            <a:r>
+              <a:rPr lang="en-FR" sz="1200" dirty="0"/>
+              <a:t>@RequestParam</a:t>
+            </a:r>
+          </a:p>
+        </p:txBody>
+      </p:sp>
+    </p:spTree>
+    <p:extLst>
+      <p:ext uri="{BB962C8B-B14F-4D97-AF65-F5344CB8AC3E}">
+        <p14:creationId xmlns:p14="http://schemas.microsoft.com/office/powerpoint/2010/main" val="1299418950"/>
+      </p:ext>
+    </p:extLst>
+  </p:cSld>
+  <p:clrMapOvr>
+    <a:masterClrMapping/>
+  </p:clrMapOvr>
+</p:sld>
+</file>
+
 <file path=ppt/theme/theme1.xml><?xml version="1.0" encoding="utf-8"?>
 <a:theme xmlns:a="http://schemas.openxmlformats.org/drawingml/2006/main" name="Office Theme">
   <a:themeElements>

</xml_diff>

<commit_message>
Spring MVC - Démo : Mapping requête HTTP
</commit_message>
<xml_diff>
--- a/schemas.pptx
+++ b/schemas.pptx
@@ -8627,7 +8627,7 @@
         <p:spPr>
           <a:xfrm>
             <a:off x="3623094" y="543464"/>
-            <a:ext cx="5253487" cy="5900468"/>
+            <a:ext cx="4146979" cy="5900468"/>
           </a:xfrm>
           <a:prstGeom prst="roundRect">
             <a:avLst/>
@@ -8722,8 +8722,8 @@
         </p:nvSpPr>
         <p:spPr>
           <a:xfrm>
-            <a:off x="1267138" y="1641358"/>
-            <a:ext cx="2278188" cy="830997"/>
+            <a:off x="400143" y="684819"/>
+            <a:ext cx="3342775" cy="1569660"/>
           </a:xfrm>
           <a:prstGeom prst="rect">
             <a:avLst/>
@@ -8747,11 +8747,36 @@
           <a:p>
             <a:r>
               <a:rPr lang="en-FR" sz="1200" i="1" dirty="0"/>
-              <a:t>URL?</a:t>
+              <a:t>PATH1/PATH2/PATH3?</a:t>
             </a:r>
             <a:r>
               <a:rPr lang="en-FR" sz="1200" b="1" i="1" dirty="0"/>
               <a:t>param1=XXX&amp;param2=XXX</a:t>
+            </a:r>
+          </a:p>
+          <a:p>
+            <a:r>
+              <a:rPr lang="en-FR" sz="1200" b="1" i="1" dirty="0"/>
+              <a:t>entete1: valeur1</a:t>
+            </a:r>
+          </a:p>
+          <a:p>
+            <a:r>
+              <a:rPr lang="en-GB" sz="1200" b="1" i="1" dirty="0"/>
+              <a:t>e</a:t>
+            </a:r>
+            <a:r>
+              <a:rPr lang="en-FR" sz="1200" b="1" i="1" dirty="0"/>
+              <a:t>ntete2 : valeur2</a:t>
+            </a:r>
+          </a:p>
+          <a:p>
+            <a:endParaRPr lang="en-FR" sz="1200" b="1" i="1" dirty="0"/>
+          </a:p>
+          <a:p>
+            <a:r>
+              <a:rPr lang="en-FR" sz="1200" b="1" i="1" dirty="0"/>
+              <a:t>corps</a:t>
             </a:r>
           </a:p>
         </p:txBody>
@@ -8991,8 +9016,8 @@
         </p:nvSpPr>
         <p:spPr>
           <a:xfrm>
-            <a:off x="6315359" y="1861321"/>
-            <a:ext cx="1992154" cy="329115"/>
+            <a:off x="8167834" y="3649748"/>
+            <a:ext cx="1992154" cy="941065"/>
           </a:xfrm>
           <a:prstGeom prst="rect">
             <a:avLst/>
@@ -9022,6 +9047,271 @@
             <a:r>
               <a:rPr lang="en-FR" sz="1200" dirty="0"/>
               <a:t>@RequestParam</a:t>
+            </a:r>
+            <a:br>
+              <a:rPr lang="en-FR" sz="1200" dirty="0"/>
+            </a:br>
+            <a:r>
+              <a:rPr lang="en-FR" sz="1200" dirty="0"/>
+              <a:t>@PathVariable</a:t>
+            </a:r>
+          </a:p>
+          <a:p>
+            <a:pPr algn="ctr"/>
+            <a:r>
+              <a:rPr lang="en-FR" sz="1200" dirty="0"/>
+              <a:t>@RequestHeader</a:t>
+            </a:r>
+          </a:p>
+          <a:p>
+            <a:pPr algn="ctr"/>
+            <a:r>
+              <a:rPr lang="en-FR" sz="1200" dirty="0"/>
+              <a:t>@RequestBody</a:t>
+            </a:r>
+          </a:p>
+        </p:txBody>
+      </p:sp>
+      <p:sp>
+        <p:nvSpPr>
+          <p:cNvPr id="17" name="Rectangle 16">
+            <a:extLst>
+              <a:ext uri="{FF2B5EF4-FFF2-40B4-BE49-F238E27FC236}">
+                <a16:creationId xmlns:a16="http://schemas.microsoft.com/office/drawing/2014/main" id="{C336C361-4536-5746-ABB1-A18AAA405D1F}"/>
+              </a:ext>
+            </a:extLst>
+          </p:cNvPr>
+          <p:cNvSpPr/>
+          <p:nvPr/>
+        </p:nvSpPr>
+        <p:spPr>
+          <a:xfrm>
+            <a:off x="8167834" y="684819"/>
+            <a:ext cx="1992154" cy="402908"/>
+          </a:xfrm>
+          <a:prstGeom prst="rect">
+            <a:avLst/>
+          </a:prstGeom>
+        </p:spPr>
+        <p:style>
+          <a:lnRef idx="2">
+            <a:schemeClr val="accent2">
+              <a:shade val="50000"/>
+            </a:schemeClr>
+          </a:lnRef>
+          <a:fillRef idx="1">
+            <a:schemeClr val="accent2"/>
+          </a:fillRef>
+          <a:effectRef idx="0">
+            <a:schemeClr val="accent2"/>
+          </a:effectRef>
+          <a:fontRef idx="minor">
+            <a:schemeClr val="lt1"/>
+          </a:fontRef>
+        </p:style>
+        <p:txBody>
+          <a:bodyPr rtlCol="0" anchor="ctr"/>
+          <a:lstStyle/>
+          <a:p>
+            <a:pPr algn="ctr"/>
+            <a:r>
+              <a:rPr lang="en-FR" sz="1200" dirty="0"/>
+              <a:t>@RestController</a:t>
+            </a:r>
+          </a:p>
+          <a:p>
+            <a:pPr algn="ctr"/>
+            <a:r>
+              <a:rPr lang="en-FR" sz="1200" dirty="0"/>
+              <a:t>@RequestMapping</a:t>
+            </a:r>
+          </a:p>
+        </p:txBody>
+      </p:sp>
+      <p:sp>
+        <p:nvSpPr>
+          <p:cNvPr id="19" name="Rectangle 18">
+            <a:extLst>
+              <a:ext uri="{FF2B5EF4-FFF2-40B4-BE49-F238E27FC236}">
+                <a16:creationId xmlns:a16="http://schemas.microsoft.com/office/drawing/2014/main" id="{E692E0C2-C049-7F41-AAAB-053230E4DDA8}"/>
+              </a:ext>
+            </a:extLst>
+          </p:cNvPr>
+          <p:cNvSpPr/>
+          <p:nvPr/>
+        </p:nvSpPr>
+        <p:spPr>
+          <a:xfrm>
+            <a:off x="8133875" y="1803134"/>
+            <a:ext cx="1992154" cy="1338442"/>
+          </a:xfrm>
+          <a:prstGeom prst="rect">
+            <a:avLst/>
+          </a:prstGeom>
+        </p:spPr>
+        <p:style>
+          <a:lnRef idx="2">
+            <a:schemeClr val="accent2">
+              <a:shade val="50000"/>
+            </a:schemeClr>
+          </a:lnRef>
+          <a:fillRef idx="1">
+            <a:schemeClr val="accent2"/>
+          </a:fillRef>
+          <a:effectRef idx="0">
+            <a:schemeClr val="accent2"/>
+          </a:effectRef>
+          <a:fontRef idx="minor">
+            <a:schemeClr val="lt1"/>
+          </a:fontRef>
+        </p:style>
+        <p:txBody>
+          <a:bodyPr rtlCol="0" anchor="ctr"/>
+          <a:lstStyle/>
+          <a:p>
+            <a:pPr algn="ctr"/>
+            <a:r>
+              <a:rPr lang="en-FR" sz="1200" dirty="0"/>
+              <a:t>@GetMapping</a:t>
+            </a:r>
+          </a:p>
+          <a:p>
+            <a:pPr algn="ctr"/>
+            <a:r>
+              <a:rPr lang="en-FR" sz="1200" dirty="0"/>
+              <a:t>@PostMapping</a:t>
+            </a:r>
+          </a:p>
+          <a:p>
+            <a:pPr algn="ctr"/>
+            <a:r>
+              <a:rPr lang="en-FR" sz="1200" dirty="0"/>
+              <a:t>@PutMapping</a:t>
+            </a:r>
+          </a:p>
+          <a:p>
+            <a:pPr algn="ctr"/>
+            <a:r>
+              <a:rPr lang="en-FR" sz="1200" dirty="0"/>
+              <a:t>….</a:t>
+            </a:r>
+          </a:p>
+          <a:p>
+            <a:pPr algn="ctr"/>
+            <a:r>
+              <a:rPr lang="en-FR" sz="1200" dirty="0"/>
+              <a:t>@RequestMapping</a:t>
+            </a:r>
+          </a:p>
+        </p:txBody>
+      </p:sp>
+      <p:sp>
+        <p:nvSpPr>
+          <p:cNvPr id="6" name="TextBox 5">
+            <a:extLst>
+              <a:ext uri="{FF2B5EF4-FFF2-40B4-BE49-F238E27FC236}">
+                <a16:creationId xmlns:a16="http://schemas.microsoft.com/office/drawing/2014/main" id="{01203B09-264E-DA49-A7C9-4A835A46DADD}"/>
+              </a:ext>
+            </a:extLst>
+          </p:cNvPr>
+          <p:cNvSpPr txBox="1"/>
+          <p:nvPr/>
+        </p:nvSpPr>
+        <p:spPr>
+          <a:xfrm>
+            <a:off x="10258114" y="786310"/>
+            <a:ext cx="766557" cy="369332"/>
+          </a:xfrm>
+          <a:prstGeom prst="rect">
+            <a:avLst/>
+          </a:prstGeom>
+          <a:noFill/>
+        </p:spPr>
+        <p:txBody>
+          <a:bodyPr wrap="none" rtlCol="0">
+            <a:spAutoFit/>
+          </a:bodyPr>
+          <a:lstStyle/>
+          <a:p>
+            <a:r>
+              <a:rPr lang="en-FR" dirty="0"/>
+              <a:t>Classe</a:t>
+            </a:r>
+          </a:p>
+        </p:txBody>
+      </p:sp>
+      <p:sp>
+        <p:nvSpPr>
+          <p:cNvPr id="21" name="TextBox 20">
+            <a:extLst>
+              <a:ext uri="{FF2B5EF4-FFF2-40B4-BE49-F238E27FC236}">
+                <a16:creationId xmlns:a16="http://schemas.microsoft.com/office/drawing/2014/main" id="{2FD20BDC-7FAB-3A4F-A5DD-F2813CD45660}"/>
+              </a:ext>
+            </a:extLst>
+          </p:cNvPr>
+          <p:cNvSpPr txBox="1"/>
+          <p:nvPr/>
+        </p:nvSpPr>
+        <p:spPr>
+          <a:xfrm>
+            <a:off x="10159988" y="2208362"/>
+            <a:ext cx="1053878" cy="369332"/>
+          </a:xfrm>
+          <a:prstGeom prst="rect">
+            <a:avLst/>
+          </a:prstGeom>
+          <a:noFill/>
+        </p:spPr>
+        <p:txBody>
+          <a:bodyPr wrap="none" rtlCol="0">
+            <a:spAutoFit/>
+          </a:bodyPr>
+          <a:lstStyle/>
+          <a:p>
+            <a:r>
+              <a:rPr lang="en-FR" dirty="0"/>
+              <a:t>Méthode</a:t>
+            </a:r>
+          </a:p>
+        </p:txBody>
+      </p:sp>
+      <p:sp>
+        <p:nvSpPr>
+          <p:cNvPr id="22" name="TextBox 21">
+            <a:extLst>
+              <a:ext uri="{FF2B5EF4-FFF2-40B4-BE49-F238E27FC236}">
+                <a16:creationId xmlns:a16="http://schemas.microsoft.com/office/drawing/2014/main" id="{E9257FBD-595D-3C4C-9CCC-236AC29D0645}"/>
+              </a:ext>
+            </a:extLst>
+          </p:cNvPr>
+          <p:cNvSpPr txBox="1"/>
+          <p:nvPr/>
+        </p:nvSpPr>
+        <p:spPr>
+          <a:xfrm>
+            <a:off x="10159988" y="3734451"/>
+            <a:ext cx="1473865" cy="646331"/>
+          </a:xfrm>
+          <a:prstGeom prst="rect">
+            <a:avLst/>
+          </a:prstGeom>
+          <a:noFill/>
+        </p:spPr>
+        <p:txBody>
+          <a:bodyPr wrap="none" rtlCol="0">
+            <a:spAutoFit/>
+          </a:bodyPr>
+          <a:lstStyle/>
+          <a:p>
+            <a:r>
+              <a:rPr lang="en-FR" dirty="0"/>
+              <a:t>Paramètres</a:t>
+            </a:r>
+          </a:p>
+          <a:p>
+            <a:r>
+              <a:rPr lang="en-FR" dirty="0"/>
+              <a:t> de méthodes</a:t>
             </a:r>
           </a:p>
         </p:txBody>

</xml_diff>

<commit_message>
Spring MVC - Démo : GET + POST /plats
</commit_message>
<xml_diff>
--- a/schemas.pptx
+++ b/schemas.pptx
@@ -14,6 +14,7 @@
     <p:sldId id="262" r:id="rId8"/>
     <p:sldId id="263" r:id="rId9"/>
     <p:sldId id="264" r:id="rId10"/>
+    <p:sldId id="265" r:id="rId11"/>
   </p:sldIdLst>
   <p:sldSz cx="12192000" cy="6858000"/>
   <p:notesSz cx="6858000" cy="9144000"/>
@@ -3877,6 +3878,852 @@
 </p:sld>
 </file>
 
+<file path=ppt/slides/slide10.xml><?xml version="1.0" encoding="utf-8"?>
+<p:sld xmlns:a="http://schemas.openxmlformats.org/drawingml/2006/main" xmlns:r="http://schemas.openxmlformats.org/officeDocument/2006/relationships" xmlns:p="http://schemas.openxmlformats.org/presentationml/2006/main">
+  <p:cSld>
+    <p:spTree>
+      <p:nvGrpSpPr>
+        <p:cNvPr id="1" name=""/>
+        <p:cNvGrpSpPr/>
+        <p:nvPr/>
+      </p:nvGrpSpPr>
+      <p:grpSpPr>
+        <a:xfrm>
+          <a:off x="0" y="0"/>
+          <a:ext cx="0" cy="0"/>
+          <a:chOff x="0" y="0"/>
+          <a:chExt cx="0" cy="0"/>
+        </a:xfrm>
+      </p:grpSpPr>
+      <p:sp>
+        <p:nvSpPr>
+          <p:cNvPr id="2" name="Rounded Rectangle 1">
+            <a:extLst>
+              <a:ext uri="{FF2B5EF4-FFF2-40B4-BE49-F238E27FC236}">
+                <a16:creationId xmlns:a16="http://schemas.microsoft.com/office/drawing/2014/main" id="{DB9F9C39-2A19-3045-8E66-A342C34D1827}"/>
+              </a:ext>
+            </a:extLst>
+          </p:cNvPr>
+          <p:cNvSpPr/>
+          <p:nvPr/>
+        </p:nvSpPr>
+        <p:spPr>
+          <a:xfrm>
+            <a:off x="3623094" y="543464"/>
+            <a:ext cx="5803710" cy="5900468"/>
+          </a:xfrm>
+          <a:prstGeom prst="roundRect">
+            <a:avLst/>
+          </a:prstGeom>
+        </p:spPr>
+        <p:style>
+          <a:lnRef idx="2">
+            <a:schemeClr val="dk1"/>
+          </a:lnRef>
+          <a:fillRef idx="1">
+            <a:schemeClr val="lt1"/>
+          </a:fillRef>
+          <a:effectRef idx="0">
+            <a:schemeClr val="dk1"/>
+          </a:effectRef>
+          <a:fontRef idx="minor">
+            <a:schemeClr val="dk1"/>
+          </a:fontRef>
+        </p:style>
+        <p:txBody>
+          <a:bodyPr rtlCol="0" anchor="t"/>
+          <a:lstStyle/>
+          <a:p>
+            <a:pPr algn="ctr"/>
+            <a:r>
+              <a:rPr lang="en-FR" dirty="0"/>
+              <a:t>Application Demo Spring MVC</a:t>
+            </a:r>
+          </a:p>
+        </p:txBody>
+      </p:sp>
+      <p:sp>
+        <p:nvSpPr>
+          <p:cNvPr id="3" name="Right Arrow 2">
+            <a:extLst>
+              <a:ext uri="{FF2B5EF4-FFF2-40B4-BE49-F238E27FC236}">
+                <a16:creationId xmlns:a16="http://schemas.microsoft.com/office/drawing/2014/main" id="{2727473E-A16B-FA48-9152-CB49F007B562}"/>
+              </a:ext>
+            </a:extLst>
+          </p:cNvPr>
+          <p:cNvSpPr/>
+          <p:nvPr/>
+        </p:nvSpPr>
+        <p:spPr>
+          <a:xfrm>
+            <a:off x="1130060" y="2363638"/>
+            <a:ext cx="2932981" cy="362309"/>
+          </a:xfrm>
+          <a:prstGeom prst="rightArrow">
+            <a:avLst/>
+          </a:prstGeom>
+          <a:solidFill>
+            <a:schemeClr val="accent2"/>
+          </a:solidFill>
+        </p:spPr>
+        <p:style>
+          <a:lnRef idx="2">
+            <a:schemeClr val="accent1">
+              <a:shade val="50000"/>
+            </a:schemeClr>
+          </a:lnRef>
+          <a:fillRef idx="1">
+            <a:schemeClr val="accent1"/>
+          </a:fillRef>
+          <a:effectRef idx="0">
+            <a:schemeClr val="accent1"/>
+          </a:effectRef>
+          <a:fontRef idx="minor">
+            <a:schemeClr val="lt1"/>
+          </a:fontRef>
+        </p:style>
+        <p:txBody>
+          <a:bodyPr rtlCol="0" anchor="ctr"/>
+          <a:lstStyle/>
+          <a:p>
+            <a:pPr algn="ctr"/>
+            <a:endParaRPr lang="en-FR"/>
+          </a:p>
+        </p:txBody>
+      </p:sp>
+      <p:sp>
+        <p:nvSpPr>
+          <p:cNvPr id="4" name="TextBox 3">
+            <a:extLst>
+              <a:ext uri="{FF2B5EF4-FFF2-40B4-BE49-F238E27FC236}">
+                <a16:creationId xmlns:a16="http://schemas.microsoft.com/office/drawing/2014/main" id="{CBB2505A-9412-664D-A73C-79AA3C2BDCAD}"/>
+              </a:ext>
+            </a:extLst>
+          </p:cNvPr>
+          <p:cNvSpPr txBox="1"/>
+          <p:nvPr/>
+        </p:nvSpPr>
+        <p:spPr>
+          <a:xfrm>
+            <a:off x="400143" y="684819"/>
+            <a:ext cx="3342775" cy="1569660"/>
+          </a:xfrm>
+          <a:prstGeom prst="rect">
+            <a:avLst/>
+          </a:prstGeom>
+          <a:noFill/>
+        </p:spPr>
+        <p:txBody>
+          <a:bodyPr wrap="none" rtlCol="0">
+            <a:spAutoFit/>
+          </a:bodyPr>
+          <a:lstStyle/>
+          <a:p>
+            <a:r>
+              <a:rPr lang="en-FR" dirty="0"/>
+              <a:t>Requête HTTP</a:t>
+            </a:r>
+          </a:p>
+          <a:p>
+            <a:endParaRPr lang="en-FR" dirty="0"/>
+          </a:p>
+          <a:p>
+            <a:r>
+              <a:rPr lang="en-FR" sz="1200" i="1" dirty="0"/>
+              <a:t>PATH1/PATH2/PATH3?</a:t>
+            </a:r>
+            <a:r>
+              <a:rPr lang="en-FR" sz="1200" b="1" i="1" dirty="0"/>
+              <a:t>param1=XXX&amp;param2=XXX</a:t>
+            </a:r>
+          </a:p>
+          <a:p>
+            <a:r>
+              <a:rPr lang="en-FR" sz="1200" b="1" i="1" dirty="0"/>
+              <a:t>entete1: valeur1</a:t>
+            </a:r>
+          </a:p>
+          <a:p>
+            <a:r>
+              <a:rPr lang="en-GB" sz="1200" b="1" i="1" dirty="0"/>
+              <a:t>e</a:t>
+            </a:r>
+            <a:r>
+              <a:rPr lang="en-FR" sz="1200" b="1" i="1" dirty="0"/>
+              <a:t>ntete2 : valeur2</a:t>
+            </a:r>
+          </a:p>
+          <a:p>
+            <a:endParaRPr lang="en-FR" sz="1200" b="1" i="1" dirty="0"/>
+          </a:p>
+          <a:p>
+            <a:r>
+              <a:rPr lang="en-FR" sz="1200" b="1" i="1" dirty="0"/>
+              <a:t>corps</a:t>
+            </a:r>
+          </a:p>
+        </p:txBody>
+      </p:sp>
+      <p:sp>
+        <p:nvSpPr>
+          <p:cNvPr id="5" name="Right Arrow 4">
+            <a:extLst>
+              <a:ext uri="{FF2B5EF4-FFF2-40B4-BE49-F238E27FC236}">
+                <a16:creationId xmlns:a16="http://schemas.microsoft.com/office/drawing/2014/main" id="{3B33AEA6-6AD4-4C43-949F-D6408B913506}"/>
+              </a:ext>
+            </a:extLst>
+          </p:cNvPr>
+          <p:cNvSpPr/>
+          <p:nvPr/>
+        </p:nvSpPr>
+        <p:spPr>
+          <a:xfrm rot="10800000">
+            <a:off x="1130060" y="3299819"/>
+            <a:ext cx="2932981" cy="362309"/>
+          </a:xfrm>
+          <a:prstGeom prst="rightArrow">
+            <a:avLst/>
+          </a:prstGeom>
+          <a:solidFill>
+            <a:schemeClr val="accent2"/>
+          </a:solidFill>
+        </p:spPr>
+        <p:style>
+          <a:lnRef idx="2">
+            <a:schemeClr val="accent1">
+              <a:shade val="50000"/>
+            </a:schemeClr>
+          </a:lnRef>
+          <a:fillRef idx="1">
+            <a:schemeClr val="accent1"/>
+          </a:fillRef>
+          <a:effectRef idx="0">
+            <a:schemeClr val="accent1"/>
+          </a:effectRef>
+          <a:fontRef idx="minor">
+            <a:schemeClr val="lt1"/>
+          </a:fontRef>
+        </p:style>
+        <p:txBody>
+          <a:bodyPr rtlCol="0" anchor="ctr"/>
+          <a:lstStyle/>
+          <a:p>
+            <a:pPr algn="ctr"/>
+            <a:endParaRPr lang="en-FR"/>
+          </a:p>
+        </p:txBody>
+      </p:sp>
+      <p:sp>
+        <p:nvSpPr>
+          <p:cNvPr id="9" name="Rectangle 8">
+            <a:extLst>
+              <a:ext uri="{FF2B5EF4-FFF2-40B4-BE49-F238E27FC236}">
+                <a16:creationId xmlns:a16="http://schemas.microsoft.com/office/drawing/2014/main" id="{EEE04ECB-FD06-E14A-A57D-883380C6C6CB}"/>
+              </a:ext>
+            </a:extLst>
+          </p:cNvPr>
+          <p:cNvSpPr/>
+          <p:nvPr/>
+        </p:nvSpPr>
+        <p:spPr>
+          <a:xfrm>
+            <a:off x="4140679" y="2208362"/>
+            <a:ext cx="1078302" cy="1595757"/>
+          </a:xfrm>
+          <a:prstGeom prst="rect">
+            <a:avLst/>
+          </a:prstGeom>
+        </p:spPr>
+        <p:style>
+          <a:lnRef idx="2">
+            <a:schemeClr val="accent1">
+              <a:shade val="50000"/>
+            </a:schemeClr>
+          </a:lnRef>
+          <a:fillRef idx="1">
+            <a:schemeClr val="accent1"/>
+          </a:fillRef>
+          <a:effectRef idx="0">
+            <a:schemeClr val="accent1"/>
+          </a:effectRef>
+          <a:fontRef idx="minor">
+            <a:schemeClr val="lt1"/>
+          </a:fontRef>
+        </p:style>
+        <p:txBody>
+          <a:bodyPr rtlCol="0" anchor="t"/>
+          <a:lstStyle/>
+          <a:p>
+            <a:pPr algn="ctr"/>
+            <a:r>
+              <a:rPr lang="en-FR" sz="1200" dirty="0"/>
+              <a:t>DispatcherServlet Spring</a:t>
+            </a:r>
+          </a:p>
+        </p:txBody>
+      </p:sp>
+      <p:sp>
+        <p:nvSpPr>
+          <p:cNvPr id="10" name="Rectangle 9">
+            <a:extLst>
+              <a:ext uri="{FF2B5EF4-FFF2-40B4-BE49-F238E27FC236}">
+                <a16:creationId xmlns:a16="http://schemas.microsoft.com/office/drawing/2014/main" id="{8BAD1C86-81F2-5B44-9E5E-EC7E61AE2360}"/>
+              </a:ext>
+            </a:extLst>
+          </p:cNvPr>
+          <p:cNvSpPr/>
+          <p:nvPr/>
+        </p:nvSpPr>
+        <p:spPr>
+          <a:xfrm>
+            <a:off x="5849259" y="1458413"/>
+            <a:ext cx="1613139" cy="508959"/>
+          </a:xfrm>
+          <a:prstGeom prst="rect">
+            <a:avLst/>
+          </a:prstGeom>
+        </p:spPr>
+        <p:style>
+          <a:lnRef idx="2">
+            <a:schemeClr val="accent1">
+              <a:shade val="50000"/>
+            </a:schemeClr>
+          </a:lnRef>
+          <a:fillRef idx="1">
+            <a:schemeClr val="accent1"/>
+          </a:fillRef>
+          <a:effectRef idx="0">
+            <a:schemeClr val="accent1"/>
+          </a:effectRef>
+          <a:fontRef idx="minor">
+            <a:schemeClr val="lt1"/>
+          </a:fontRef>
+        </p:style>
+        <p:txBody>
+          <a:bodyPr rtlCol="0" anchor="ctr"/>
+          <a:lstStyle/>
+          <a:p>
+            <a:pPr algn="ctr"/>
+            <a:r>
+              <a:rPr lang="en-FR" dirty="0"/>
+              <a:t>PlatDbCtrl</a:t>
+            </a:r>
+          </a:p>
+        </p:txBody>
+      </p:sp>
+      <p:cxnSp>
+        <p:nvCxnSpPr>
+          <p:cNvPr id="12" name="Straight Arrow Connector 11">
+            <a:extLst>
+              <a:ext uri="{FF2B5EF4-FFF2-40B4-BE49-F238E27FC236}">
+                <a16:creationId xmlns:a16="http://schemas.microsoft.com/office/drawing/2014/main" id="{BF70E3D0-67AD-9448-BD53-A541A6E59EEE}"/>
+              </a:ext>
+            </a:extLst>
+          </p:cNvPr>
+          <p:cNvCxnSpPr/>
+          <p:nvPr/>
+        </p:nvCxnSpPr>
+        <p:spPr>
+          <a:xfrm flipV="1">
+            <a:off x="5322498" y="2113472"/>
+            <a:ext cx="629728" cy="517585"/>
+          </a:xfrm>
+          <a:prstGeom prst="straightConnector1">
+            <a:avLst/>
+          </a:prstGeom>
+          <a:ln>
+            <a:tailEnd type="triangle"/>
+          </a:ln>
+        </p:spPr>
+        <p:style>
+          <a:lnRef idx="1">
+            <a:schemeClr val="accent1"/>
+          </a:lnRef>
+          <a:fillRef idx="0">
+            <a:schemeClr val="accent1"/>
+          </a:fillRef>
+          <a:effectRef idx="0">
+            <a:schemeClr val="accent1"/>
+          </a:effectRef>
+          <a:fontRef idx="minor">
+            <a:schemeClr val="tx1"/>
+          </a:fontRef>
+        </p:style>
+      </p:cxnSp>
+      <p:sp>
+        <p:nvSpPr>
+          <p:cNvPr id="13" name="TextBox 12">
+            <a:extLst>
+              <a:ext uri="{FF2B5EF4-FFF2-40B4-BE49-F238E27FC236}">
+                <a16:creationId xmlns:a16="http://schemas.microsoft.com/office/drawing/2014/main" id="{8E0C8947-BCB3-7847-8BFC-77A89A55C8B4}"/>
+              </a:ext>
+            </a:extLst>
+          </p:cNvPr>
+          <p:cNvSpPr txBox="1"/>
+          <p:nvPr/>
+        </p:nvSpPr>
+        <p:spPr>
+          <a:xfrm>
+            <a:off x="5305328" y="2084385"/>
+            <a:ext cx="543931" cy="276999"/>
+          </a:xfrm>
+          <a:prstGeom prst="rect">
+            <a:avLst/>
+          </a:prstGeom>
+          <a:noFill/>
+        </p:spPr>
+        <p:txBody>
+          <a:bodyPr wrap="none" rtlCol="0">
+            <a:spAutoFit/>
+          </a:bodyPr>
+          <a:lstStyle/>
+          <a:p>
+            <a:r>
+              <a:rPr lang="en-FR" sz="1200" dirty="0"/>
+              <a:t>/plats</a:t>
+            </a:r>
+          </a:p>
+        </p:txBody>
+      </p:sp>
+      <p:sp>
+        <p:nvSpPr>
+          <p:cNvPr id="16" name="Rectangle 15">
+            <a:extLst>
+              <a:ext uri="{FF2B5EF4-FFF2-40B4-BE49-F238E27FC236}">
+                <a16:creationId xmlns:a16="http://schemas.microsoft.com/office/drawing/2014/main" id="{A32DC4A5-6F0A-4B4D-B11E-B21BB839FD7A}"/>
+              </a:ext>
+            </a:extLst>
+          </p:cNvPr>
+          <p:cNvSpPr/>
+          <p:nvPr/>
+        </p:nvSpPr>
+        <p:spPr>
+          <a:xfrm>
+            <a:off x="6378731" y="3045339"/>
+            <a:ext cx="1613139" cy="508959"/>
+          </a:xfrm>
+          <a:prstGeom prst="rect">
+            <a:avLst/>
+          </a:prstGeom>
+        </p:spPr>
+        <p:style>
+          <a:lnRef idx="2">
+            <a:schemeClr val="accent1">
+              <a:shade val="50000"/>
+            </a:schemeClr>
+          </a:lnRef>
+          <a:fillRef idx="1">
+            <a:schemeClr val="accent1"/>
+          </a:fillRef>
+          <a:effectRef idx="0">
+            <a:schemeClr val="accent1"/>
+          </a:effectRef>
+          <a:fontRef idx="minor">
+            <a:schemeClr val="lt1"/>
+          </a:fontRef>
+        </p:style>
+        <p:txBody>
+          <a:bodyPr rtlCol="0" anchor="ctr"/>
+          <a:lstStyle/>
+          <a:p>
+            <a:pPr algn="ctr"/>
+            <a:r>
+              <a:rPr lang="en-FR" dirty="0"/>
+              <a:t>PlatService</a:t>
+            </a:r>
+          </a:p>
+        </p:txBody>
+      </p:sp>
+      <p:cxnSp>
+        <p:nvCxnSpPr>
+          <p:cNvPr id="20" name="Straight Arrow Connector 19">
+            <a:extLst>
+              <a:ext uri="{FF2B5EF4-FFF2-40B4-BE49-F238E27FC236}">
+                <a16:creationId xmlns:a16="http://schemas.microsoft.com/office/drawing/2014/main" id="{29085499-A174-0B42-88CB-9C25AE3DF5A6}"/>
+              </a:ext>
+            </a:extLst>
+          </p:cNvPr>
+          <p:cNvCxnSpPr>
+            <a:cxnSpLocks/>
+          </p:cNvCxnSpPr>
+          <p:nvPr/>
+        </p:nvCxnSpPr>
+        <p:spPr>
+          <a:xfrm>
+            <a:off x="6524949" y="2208362"/>
+            <a:ext cx="440920" cy="673959"/>
+          </a:xfrm>
+          <a:prstGeom prst="straightConnector1">
+            <a:avLst/>
+          </a:prstGeom>
+          <a:ln>
+            <a:tailEnd type="triangle"/>
+          </a:ln>
+        </p:spPr>
+        <p:style>
+          <a:lnRef idx="1">
+            <a:schemeClr val="accent1"/>
+          </a:lnRef>
+          <a:fillRef idx="0">
+            <a:schemeClr val="accent1"/>
+          </a:fillRef>
+          <a:effectRef idx="0">
+            <a:schemeClr val="accent1"/>
+          </a:effectRef>
+          <a:fontRef idx="minor">
+            <a:schemeClr val="tx1"/>
+          </a:fontRef>
+        </p:style>
+      </p:cxnSp>
+      <p:sp>
+        <p:nvSpPr>
+          <p:cNvPr id="23" name="Rectangle 22">
+            <a:extLst>
+              <a:ext uri="{FF2B5EF4-FFF2-40B4-BE49-F238E27FC236}">
+                <a16:creationId xmlns:a16="http://schemas.microsoft.com/office/drawing/2014/main" id="{A3072017-9719-9D48-A623-1D8C1756A994}"/>
+              </a:ext>
+            </a:extLst>
+          </p:cNvPr>
+          <p:cNvSpPr/>
+          <p:nvPr/>
+        </p:nvSpPr>
+        <p:spPr>
+          <a:xfrm>
+            <a:off x="7167336" y="4310101"/>
+            <a:ext cx="1613139" cy="508959"/>
+          </a:xfrm>
+          <a:prstGeom prst="rect">
+            <a:avLst/>
+          </a:prstGeom>
+        </p:spPr>
+        <p:style>
+          <a:lnRef idx="2">
+            <a:schemeClr val="accent1">
+              <a:shade val="50000"/>
+            </a:schemeClr>
+          </a:lnRef>
+          <a:fillRef idx="1">
+            <a:schemeClr val="accent1"/>
+          </a:fillRef>
+          <a:effectRef idx="0">
+            <a:schemeClr val="accent1"/>
+          </a:effectRef>
+          <a:fontRef idx="minor">
+            <a:schemeClr val="lt1"/>
+          </a:fontRef>
+        </p:style>
+        <p:txBody>
+          <a:bodyPr rtlCol="0" anchor="ctr"/>
+          <a:lstStyle/>
+          <a:p>
+            <a:pPr algn="ctr"/>
+            <a:r>
+              <a:rPr lang="en-FR" dirty="0"/>
+              <a:t>PlatRepo</a:t>
+            </a:r>
+          </a:p>
+        </p:txBody>
+      </p:sp>
+      <p:cxnSp>
+        <p:nvCxnSpPr>
+          <p:cNvPr id="24" name="Straight Arrow Connector 23">
+            <a:extLst>
+              <a:ext uri="{FF2B5EF4-FFF2-40B4-BE49-F238E27FC236}">
+                <a16:creationId xmlns:a16="http://schemas.microsoft.com/office/drawing/2014/main" id="{DABC6CBC-4B9E-C040-A78D-04C8468BC991}"/>
+              </a:ext>
+            </a:extLst>
+          </p:cNvPr>
+          <p:cNvCxnSpPr>
+            <a:cxnSpLocks/>
+          </p:cNvCxnSpPr>
+          <p:nvPr/>
+        </p:nvCxnSpPr>
+        <p:spPr>
+          <a:xfrm>
+            <a:off x="7346601" y="3595220"/>
+            <a:ext cx="440920" cy="673959"/>
+          </a:xfrm>
+          <a:prstGeom prst="straightConnector1">
+            <a:avLst/>
+          </a:prstGeom>
+          <a:ln>
+            <a:tailEnd type="triangle"/>
+          </a:ln>
+        </p:spPr>
+        <p:style>
+          <a:lnRef idx="1">
+            <a:schemeClr val="accent1"/>
+          </a:lnRef>
+          <a:fillRef idx="0">
+            <a:schemeClr val="accent1"/>
+          </a:fillRef>
+          <a:effectRef idx="0">
+            <a:schemeClr val="accent1"/>
+          </a:effectRef>
+          <a:fontRef idx="minor">
+            <a:schemeClr val="tx1"/>
+          </a:fontRef>
+        </p:style>
+      </p:cxnSp>
+      <p:sp>
+        <p:nvSpPr>
+          <p:cNvPr id="8" name="Can 7">
+            <a:extLst>
+              <a:ext uri="{FF2B5EF4-FFF2-40B4-BE49-F238E27FC236}">
+                <a16:creationId xmlns:a16="http://schemas.microsoft.com/office/drawing/2014/main" id="{065440BE-0B14-ED4B-9029-2F3B8FD5DB52}"/>
+              </a:ext>
+            </a:extLst>
+          </p:cNvPr>
+          <p:cNvSpPr/>
+          <p:nvPr/>
+        </p:nvSpPr>
+        <p:spPr>
+          <a:xfrm>
+            <a:off x="10228082" y="3662129"/>
+            <a:ext cx="1564850" cy="2229624"/>
+          </a:xfrm>
+          <a:prstGeom prst="can">
+            <a:avLst/>
+          </a:prstGeom>
+        </p:spPr>
+        <p:style>
+          <a:lnRef idx="2">
+            <a:schemeClr val="accent1">
+              <a:shade val="50000"/>
+            </a:schemeClr>
+          </a:lnRef>
+          <a:fillRef idx="1">
+            <a:schemeClr val="accent1"/>
+          </a:fillRef>
+          <a:effectRef idx="0">
+            <a:schemeClr val="accent1"/>
+          </a:effectRef>
+          <a:fontRef idx="minor">
+            <a:schemeClr val="lt1"/>
+          </a:fontRef>
+        </p:style>
+        <p:txBody>
+          <a:bodyPr rtlCol="0" anchor="ctr"/>
+          <a:lstStyle/>
+          <a:p>
+            <a:pPr algn="ctr"/>
+            <a:r>
+              <a:rPr lang="en-FR" dirty="0"/>
+              <a:t>Base de données</a:t>
+            </a:r>
+          </a:p>
+        </p:txBody>
+      </p:sp>
+      <p:cxnSp>
+        <p:nvCxnSpPr>
+          <p:cNvPr id="25" name="Straight Arrow Connector 24">
+            <a:extLst>
+              <a:ext uri="{FF2B5EF4-FFF2-40B4-BE49-F238E27FC236}">
+                <a16:creationId xmlns:a16="http://schemas.microsoft.com/office/drawing/2014/main" id="{5BF230D8-AE0B-A24B-9CF6-A6E09CC81DB8}"/>
+              </a:ext>
+            </a:extLst>
+          </p:cNvPr>
+          <p:cNvCxnSpPr>
+            <a:cxnSpLocks/>
+          </p:cNvCxnSpPr>
+          <p:nvPr/>
+        </p:nvCxnSpPr>
+        <p:spPr>
+          <a:xfrm>
+            <a:off x="8955464" y="4547778"/>
+            <a:ext cx="1093509" cy="0"/>
+          </a:xfrm>
+          <a:prstGeom prst="straightConnector1">
+            <a:avLst/>
+          </a:prstGeom>
+          <a:ln>
+            <a:tailEnd type="triangle"/>
+          </a:ln>
+        </p:spPr>
+        <p:style>
+          <a:lnRef idx="1">
+            <a:schemeClr val="accent1"/>
+          </a:lnRef>
+          <a:fillRef idx="0">
+            <a:schemeClr val="accent1"/>
+          </a:fillRef>
+          <a:effectRef idx="0">
+            <a:schemeClr val="accent1"/>
+          </a:effectRef>
+          <a:fontRef idx="minor">
+            <a:schemeClr val="tx1"/>
+          </a:fontRef>
+        </p:style>
+      </p:cxnSp>
+      <p:sp>
+        <p:nvSpPr>
+          <p:cNvPr id="15" name="Rectangle 14">
+            <a:extLst>
+              <a:ext uri="{FF2B5EF4-FFF2-40B4-BE49-F238E27FC236}">
+                <a16:creationId xmlns:a16="http://schemas.microsoft.com/office/drawing/2014/main" id="{91883D39-EC87-ED4F-824C-338359F3BE67}"/>
+              </a:ext>
+            </a:extLst>
+          </p:cNvPr>
+          <p:cNvSpPr/>
+          <p:nvPr/>
+        </p:nvSpPr>
+        <p:spPr>
+          <a:xfrm>
+            <a:off x="697584" y="3853591"/>
+            <a:ext cx="8329225" cy="1545996"/>
+          </a:xfrm>
+          <a:prstGeom prst="rect">
+            <a:avLst/>
+          </a:prstGeom>
+          <a:noFill/>
+        </p:spPr>
+        <p:style>
+          <a:lnRef idx="2">
+            <a:schemeClr val="accent6"/>
+          </a:lnRef>
+          <a:fillRef idx="1">
+            <a:schemeClr val="lt1"/>
+          </a:fillRef>
+          <a:effectRef idx="0">
+            <a:schemeClr val="accent6"/>
+          </a:effectRef>
+          <a:fontRef idx="minor">
+            <a:schemeClr val="dk1"/>
+          </a:fontRef>
+        </p:style>
+        <p:txBody>
+          <a:bodyPr rtlCol="0" anchor="ctr"/>
+          <a:lstStyle/>
+          <a:p>
+            <a:pPr algn="ctr"/>
+            <a:r>
+              <a:rPr lang="en-FR" dirty="0">
+                <a:solidFill>
+                  <a:schemeClr val="accent6"/>
+                </a:solidFill>
+              </a:rPr>
+              <a:t>Couche Persistance</a:t>
+            </a:r>
+          </a:p>
+        </p:txBody>
+      </p:sp>
+      <p:sp>
+        <p:nvSpPr>
+          <p:cNvPr id="26" name="Rectangle 25">
+            <a:extLst>
+              <a:ext uri="{FF2B5EF4-FFF2-40B4-BE49-F238E27FC236}">
+                <a16:creationId xmlns:a16="http://schemas.microsoft.com/office/drawing/2014/main" id="{51301C06-25E3-6E4E-BF3A-DA9C296AFEA2}"/>
+              </a:ext>
+            </a:extLst>
+          </p:cNvPr>
+          <p:cNvSpPr/>
+          <p:nvPr/>
+        </p:nvSpPr>
+        <p:spPr>
+          <a:xfrm>
+            <a:off x="5667052" y="2668187"/>
+            <a:ext cx="5803710" cy="1126941"/>
+          </a:xfrm>
+          <a:prstGeom prst="rect">
+            <a:avLst/>
+          </a:prstGeom>
+          <a:noFill/>
+        </p:spPr>
+        <p:style>
+          <a:lnRef idx="2">
+            <a:schemeClr val="accent6"/>
+          </a:lnRef>
+          <a:fillRef idx="1">
+            <a:schemeClr val="lt1"/>
+          </a:fillRef>
+          <a:effectRef idx="0">
+            <a:schemeClr val="accent6"/>
+          </a:effectRef>
+          <a:fontRef idx="minor">
+            <a:schemeClr val="dk1"/>
+          </a:fontRef>
+        </p:style>
+        <p:txBody>
+          <a:bodyPr rtlCol="0" anchor="ctr"/>
+          <a:lstStyle/>
+          <a:p>
+            <a:pPr algn="ctr"/>
+            <a:r>
+              <a:rPr lang="en-FR" dirty="0">
+                <a:solidFill>
+                  <a:schemeClr val="accent6"/>
+                </a:solidFill>
+              </a:rPr>
+              <a:t>Couche métier</a:t>
+            </a:r>
+          </a:p>
+        </p:txBody>
+      </p:sp>
+      <p:sp>
+        <p:nvSpPr>
+          <p:cNvPr id="27" name="Rectangle 26">
+            <a:extLst>
+              <a:ext uri="{FF2B5EF4-FFF2-40B4-BE49-F238E27FC236}">
+                <a16:creationId xmlns:a16="http://schemas.microsoft.com/office/drawing/2014/main" id="{FA835D23-7457-EF48-8638-50A408B1A6E6}"/>
+              </a:ext>
+            </a:extLst>
+          </p:cNvPr>
+          <p:cNvSpPr/>
+          <p:nvPr/>
+        </p:nvSpPr>
+        <p:spPr>
+          <a:xfrm>
+            <a:off x="5736566" y="1305161"/>
+            <a:ext cx="5803710" cy="1126941"/>
+          </a:xfrm>
+          <a:prstGeom prst="rect">
+            <a:avLst/>
+          </a:prstGeom>
+          <a:noFill/>
+        </p:spPr>
+        <p:style>
+          <a:lnRef idx="2">
+            <a:schemeClr val="accent6"/>
+          </a:lnRef>
+          <a:fillRef idx="1">
+            <a:schemeClr val="lt1"/>
+          </a:fillRef>
+          <a:effectRef idx="0">
+            <a:schemeClr val="accent6"/>
+          </a:effectRef>
+          <a:fontRef idx="minor">
+            <a:schemeClr val="dk1"/>
+          </a:fontRef>
+        </p:style>
+        <p:txBody>
+          <a:bodyPr rtlCol="0" anchor="ctr"/>
+          <a:lstStyle/>
+          <a:p>
+            <a:pPr algn="ctr"/>
+            <a:r>
+              <a:rPr lang="en-FR" dirty="0">
+                <a:solidFill>
+                  <a:schemeClr val="accent6"/>
+                </a:solidFill>
+              </a:rPr>
+              <a:t>Couche Présentation</a:t>
+            </a:r>
+          </a:p>
+        </p:txBody>
+      </p:sp>
+    </p:spTree>
+    <p:extLst>
+      <p:ext uri="{BB962C8B-B14F-4D97-AF65-F5344CB8AC3E}">
+        <p14:creationId xmlns:p14="http://schemas.microsoft.com/office/powerpoint/2010/main" val="1466046170"/>
+      </p:ext>
+    </p:extLst>
+  </p:cSld>
+  <p:clrMapOvr>
+    <a:masterClrMapping/>
+  </p:clrMapOvr>
+</p:sld>
+</file>
+
 <file path=ppt/slides/slide2.xml><?xml version="1.0" encoding="utf-8"?>
 <p:sld xmlns:a="http://schemas.openxmlformats.org/drawingml/2006/main" xmlns:r="http://schemas.openxmlformats.org/officeDocument/2006/relationships" xmlns:p="http://schemas.openxmlformats.org/presentationml/2006/main">
   <p:cSld>
@@ -8514,7 +9361,7 @@
             <a:pPr algn="ctr"/>
             <a:r>
               <a:rPr lang="en-FR" sz="1200" dirty="0"/>
-              <a:t>@Controller</a:t>
+              <a:t>@RestController</a:t>
             </a:r>
           </a:p>
           <a:p>
@@ -8570,7 +9417,7 @@
             <a:pPr algn="ctr"/>
             <a:r>
               <a:rPr lang="en-FR" sz="1200" dirty="0"/>
-              <a:t>@Controller</a:t>
+              <a:t>@RestController</a:t>
             </a:r>
           </a:p>
           <a:p>

</xml_diff>